<commit_message>
update study 2017-4-6 23:58
</commit_message>
<xml_diff>
--- a/study_Vue/学习Vue.pptx
+++ b/study_Vue/学习Vue.pptx
@@ -10,7 +10,21 @@
     <p:sldId id="258" r:id="rId5"/>
     <p:sldId id="259" r:id="rId6"/>
     <p:sldId id="260" r:id="rId7"/>
-    <p:sldId id="261" r:id="rId8"/>
+    <p:sldId id="270" r:id="rId8"/>
+    <p:sldId id="271" r:id="rId9"/>
+    <p:sldId id="272" r:id="rId10"/>
+    <p:sldId id="273" r:id="rId11"/>
+    <p:sldId id="261" r:id="rId12"/>
+    <p:sldId id="262" r:id="rId13"/>
+    <p:sldId id="263" r:id="rId14"/>
+    <p:sldId id="264" r:id="rId15"/>
+    <p:sldId id="267" r:id="rId16"/>
+    <p:sldId id="266" r:id="rId17"/>
+    <p:sldId id="265" r:id="rId18"/>
+    <p:sldId id="268" r:id="rId19"/>
+    <p:sldId id="269" r:id="rId20"/>
+    <p:sldId id="274" r:id="rId21"/>
+    <p:sldId id="275" r:id="rId22"/>
   </p:sldIdLst>
   <p:sldSz cx="12192000" cy="6858000"/>
   <p:notesSz cx="7103745" cy="10234295"/>
@@ -2646,7 +2660,6 @@
           <a:p>
             <a:r>
               <a:rPr lang="zh-CN" altLang="en-US">
-                <a:ln/>
                 <a:gradFill>
                   <a:gsLst>
                     <a:gs pos="21000">
@@ -2666,7 +2679,6 @@
             </a:r>
             <a:r>
               <a:rPr lang="en-US" altLang="zh-CN">
-                <a:ln/>
                 <a:gradFill>
                   <a:gsLst>
                     <a:gs pos="21000">
@@ -2685,7 +2697,6 @@
               <a:t>Vue.js</a:t>
             </a:r>
             <a:endParaRPr lang="en-US" altLang="zh-CN">
-              <a:ln/>
               <a:gradFill>
                 <a:gsLst>
                   <a:gs pos="21000">
@@ -2736,6 +2747,1525 @@
               <a:latin typeface="楷体" panose="02010609060101010101" charset="-122"/>
               <a:ea typeface="楷体" panose="02010609060101010101" charset="-122"/>
             </a:endParaRPr>
+          </a:p>
+        </p:txBody>
+      </p:sp>
+    </p:spTree>
+  </p:cSld>
+  <p:clrMapOvr>
+    <a:masterClrMapping/>
+  </p:clrMapOvr>
+</p:sld>
+</file>
+
+<file path=ppt/slides/slide10.xml><?xml version="1.0" encoding="utf-8"?>
+<p:sld xmlns:a="http://schemas.openxmlformats.org/drawingml/2006/main" xmlns:r="http://schemas.openxmlformats.org/officeDocument/2006/relationships" xmlns:p="http://schemas.openxmlformats.org/presentationml/2006/main">
+  <p:cSld>
+    <p:spTree>
+      <p:nvGrpSpPr>
+        <p:cNvPr id="1" name=""/>
+        <p:cNvGrpSpPr/>
+        <p:nvPr/>
+      </p:nvGrpSpPr>
+      <p:grpSpPr/>
+      <p:sp>
+        <p:nvSpPr>
+          <p:cNvPr id="2" name="标题 1"/>
+          <p:cNvSpPr>
+            <a:spLocks noGrp="1"/>
+          </p:cNvSpPr>
+          <p:nvPr>
+            <p:ph type="title"/>
+          </p:nvPr>
+        </p:nvSpPr>
+        <p:spPr/>
+        <p:txBody>
+          <a:bodyPr/>
+          <a:p>
+            <a:r>
+              <a:rPr lang="en-US" altLang="zh-CN"/>
+              <a:t>Vue</a:t>
+            </a:r>
+            <a:r>
+              <a:rPr lang="zh-CN" altLang="en-US"/>
+              <a:t>如何实现双向绑定</a:t>
+            </a:r>
+            <a:endParaRPr lang="zh-CN" altLang="en-US"/>
+          </a:p>
+        </p:txBody>
+      </p:sp>
+      <p:sp>
+        <p:nvSpPr>
+          <p:cNvPr id="3" name="内容占位符 2"/>
+          <p:cNvSpPr>
+            <a:spLocks noGrp="1"/>
+          </p:cNvSpPr>
+          <p:nvPr>
+            <p:ph idx="1"/>
+          </p:nvPr>
+        </p:nvSpPr>
+        <p:spPr>
+          <a:xfrm>
+            <a:off x="838200" y="1825625"/>
+            <a:ext cx="10686415" cy="4351655"/>
+          </a:xfrm>
+        </p:spPr>
+        <p:txBody>
+          <a:bodyPr/>
+          <a:p>
+            <a:r>
+              <a:rPr lang="zh-CN" altLang="en-US"/>
+              <a:t>MVVM模式本身是实现了双向绑定的，在Vue.js中可以使用v-model指令在表单元素上创建双向数据绑定。</a:t>
+            </a:r>
+            <a:endParaRPr lang="zh-CN" altLang="en-US"/>
+          </a:p>
+          <a:p>
+            <a:r>
+              <a:rPr lang="en-US" altLang="zh-CN"/>
+              <a:t>Vue</a:t>
+            </a:r>
+            <a:r>
+              <a:rPr lang="zh-CN" altLang="en-US"/>
+              <a:t>双向绑定示例。</a:t>
+            </a:r>
+            <a:endParaRPr lang="zh-CN" altLang="en-US"/>
+          </a:p>
+        </p:txBody>
+      </p:sp>
+    </p:spTree>
+  </p:cSld>
+  <p:clrMapOvr>
+    <a:masterClrMapping/>
+  </p:clrMapOvr>
+</p:sld>
+</file>
+
+<file path=ppt/slides/slide11.xml><?xml version="1.0" encoding="utf-8"?>
+<p:sld xmlns:a="http://schemas.openxmlformats.org/drawingml/2006/main" xmlns:r="http://schemas.openxmlformats.org/officeDocument/2006/relationships" xmlns:p="http://schemas.openxmlformats.org/presentationml/2006/main">
+  <p:cSld>
+    <p:spTree>
+      <p:nvGrpSpPr>
+        <p:cNvPr id="1" name=""/>
+        <p:cNvGrpSpPr/>
+        <p:nvPr/>
+      </p:nvGrpSpPr>
+      <p:grpSpPr/>
+      <p:sp>
+        <p:nvSpPr>
+          <p:cNvPr id="2" name="标题 1"/>
+          <p:cNvSpPr>
+            <a:spLocks noGrp="1"/>
+          </p:cNvSpPr>
+          <p:nvPr>
+            <p:ph type="title"/>
+          </p:nvPr>
+        </p:nvSpPr>
+        <p:spPr/>
+        <p:txBody>
+          <a:bodyPr/>
+          <a:p>
+            <a:r>
+              <a:rPr lang="en-US" altLang="zh-CN">
+                <a:latin typeface="楷体" panose="02010609060101010101" charset="-122"/>
+                <a:ea typeface="楷体" panose="02010609060101010101" charset="-122"/>
+              </a:rPr>
+              <a:t>Vue</a:t>
+            </a:r>
+            <a:r>
+              <a:rPr lang="zh-CN" altLang="en-US">
+                <a:latin typeface="楷体" panose="02010609060101010101" charset="-122"/>
+                <a:ea typeface="楷体" panose="02010609060101010101" charset="-122"/>
+              </a:rPr>
+              <a:t>指令</a:t>
+            </a:r>
+            <a:endParaRPr lang="zh-CN" altLang="en-US">
+              <a:latin typeface="楷体" panose="02010609060101010101" charset="-122"/>
+              <a:ea typeface="楷体" panose="02010609060101010101" charset="-122"/>
+            </a:endParaRPr>
+          </a:p>
+        </p:txBody>
+      </p:sp>
+      <p:sp>
+        <p:nvSpPr>
+          <p:cNvPr id="3" name="内容占位符 2"/>
+          <p:cNvSpPr>
+            <a:spLocks noGrp="1"/>
+          </p:cNvSpPr>
+          <p:nvPr>
+            <p:ph idx="1"/>
+          </p:nvPr>
+        </p:nvSpPr>
+        <p:spPr/>
+        <p:txBody>
+          <a:bodyPr/>
+          <a:p>
+            <a:r>
+              <a:rPr lang="zh-CN" altLang="en-US"/>
+              <a:t>v-model是Vue.js常用的一个指令。</a:t>
+            </a:r>
+            <a:endParaRPr lang="zh-CN" altLang="en-US"/>
+          </a:p>
+          <a:p>
+            <a:r>
+              <a:rPr lang="zh-CN" altLang="en-US"/>
+              <a:t>Vue.js指令：</a:t>
+            </a:r>
+            <a:endParaRPr lang="zh-CN" altLang="en-US"/>
+          </a:p>
+          <a:p>
+            <a:pPr marL="0" indent="0">
+              <a:buNone/>
+            </a:pPr>
+            <a:r>
+              <a:rPr lang="zh-CN" altLang="en-US"/>
+              <a:t>	以v-开头的，它们作用于HTML元素，指令提供了一些特殊的特性，将指令绑定在元素上时，指令会为绑定的目标元素添加一些特殊的行为，我们可以将指令看作特殊的HTML特性（attribute）。</a:t>
+            </a:r>
+            <a:endParaRPr lang="zh-CN" altLang="en-US"/>
+          </a:p>
+          <a:p>
+            <a:pPr marL="0" indent="0">
+              <a:buNone/>
+            </a:pPr>
+            <a:r>
+              <a:rPr lang="en-US" altLang="zh-CN"/>
+              <a:t>	Vue.js</a:t>
+            </a:r>
+            <a:r>
+              <a:rPr lang="zh-CN" altLang="zh-CN"/>
+              <a:t>指令内可以直接通过</a:t>
+            </a:r>
+            <a:r>
+              <a:rPr lang="en-US" altLang="zh-CN"/>
+              <a:t>key</a:t>
+            </a:r>
+            <a:r>
+              <a:rPr lang="zh-CN" altLang="zh-CN"/>
+              <a:t>调用</a:t>
+            </a:r>
+            <a:r>
+              <a:rPr lang="en-US" altLang="zh-CN"/>
+              <a:t>Vue</a:t>
+            </a:r>
+            <a:r>
+              <a:rPr lang="zh-CN" altLang="en-US"/>
+              <a:t>实例内的</a:t>
+            </a:r>
+            <a:r>
+              <a:rPr lang="en-US" altLang="zh-CN"/>
+              <a:t>data</a:t>
+            </a:r>
+            <a:r>
+              <a:rPr lang="zh-CN" altLang="en-US"/>
+              <a:t>数据。</a:t>
+            </a:r>
+            <a:endParaRPr lang="en-US" altLang="zh-CN"/>
+          </a:p>
+        </p:txBody>
+      </p:sp>
+    </p:spTree>
+  </p:cSld>
+  <p:clrMapOvr>
+    <a:masterClrMapping/>
+  </p:clrMapOvr>
+</p:sld>
+</file>
+
+<file path=ppt/slides/slide12.xml><?xml version="1.0" encoding="utf-8"?>
+<p:sld xmlns:a="http://schemas.openxmlformats.org/drawingml/2006/main" xmlns:r="http://schemas.openxmlformats.org/officeDocument/2006/relationships" xmlns:p="http://schemas.openxmlformats.org/presentationml/2006/main">
+  <p:cSld>
+    <p:spTree>
+      <p:nvGrpSpPr>
+        <p:cNvPr id="1" name=""/>
+        <p:cNvGrpSpPr/>
+        <p:nvPr/>
+      </p:nvGrpSpPr>
+      <p:grpSpPr/>
+      <p:sp>
+        <p:nvSpPr>
+          <p:cNvPr id="2" name="标题 1"/>
+          <p:cNvSpPr>
+            <a:spLocks noGrp="1"/>
+          </p:cNvSpPr>
+          <p:nvPr>
+            <p:ph type="title"/>
+          </p:nvPr>
+        </p:nvSpPr>
+        <p:spPr/>
+        <p:txBody>
+          <a:bodyPr/>
+          <a:p>
+            <a:r>
+              <a:rPr lang="zh-CN" altLang="en-US">
+                <a:latin typeface="楷体" panose="02010609060101010101" charset="-122"/>
+                <a:ea typeface="楷体" panose="02010609060101010101" charset="-122"/>
+              </a:rPr>
+              <a:t>常用</a:t>
+            </a:r>
+            <a:r>
+              <a:rPr lang="en-US" altLang="zh-CN">
+                <a:latin typeface="楷体" panose="02010609060101010101" charset="-122"/>
+                <a:ea typeface="楷体" panose="02010609060101010101" charset="-122"/>
+              </a:rPr>
+              <a:t>Vue</a:t>
+            </a:r>
+            <a:r>
+              <a:rPr lang="zh-CN" altLang="en-US">
+                <a:latin typeface="楷体" panose="02010609060101010101" charset="-122"/>
+                <a:ea typeface="楷体" panose="02010609060101010101" charset="-122"/>
+              </a:rPr>
+              <a:t>指令</a:t>
+            </a:r>
+            <a:endParaRPr lang="zh-CN" altLang="en-US">
+              <a:latin typeface="楷体" panose="02010609060101010101" charset="-122"/>
+              <a:ea typeface="楷体" panose="02010609060101010101" charset="-122"/>
+            </a:endParaRPr>
+          </a:p>
+        </p:txBody>
+      </p:sp>
+      <p:sp>
+        <p:nvSpPr>
+          <p:cNvPr id="3" name="内容占位符 2"/>
+          <p:cNvSpPr>
+            <a:spLocks noGrp="1"/>
+          </p:cNvSpPr>
+          <p:nvPr>
+            <p:ph idx="1"/>
+          </p:nvPr>
+        </p:nvSpPr>
+        <p:spPr>
+          <a:xfrm>
+            <a:off x="838200" y="1825625"/>
+            <a:ext cx="10786745" cy="4351655"/>
+          </a:xfrm>
+        </p:spPr>
+        <p:txBody>
+          <a:bodyPr/>
+          <a:p>
+            <a:r>
+              <a:rPr lang="en-US" altLang="en-US"/>
+              <a:t>v-if		</a:t>
+            </a:r>
+            <a:r>
+              <a:rPr lang="en-US" altLang="en-US" sz="2400">
+                <a:latin typeface="宋体" panose="02010600030101010101" pitchFamily="2" charset="-122"/>
+                <a:ea typeface="宋体" panose="02010600030101010101" pitchFamily="2" charset="-122"/>
+              </a:rPr>
+              <a:t>条件渲染指令，它根据表达式的真假来删除和插入元素</a:t>
+            </a:r>
+            <a:endParaRPr lang="zh-CN" altLang="en-US" sz="2400">
+              <a:latin typeface="宋体" panose="02010600030101010101" pitchFamily="2" charset="-122"/>
+              <a:ea typeface="宋体" panose="02010600030101010101" pitchFamily="2" charset="-122"/>
+            </a:endParaRPr>
+          </a:p>
+          <a:p>
+            <a:r>
+              <a:rPr lang="en-US" altLang="en-US" sz="2800">
+                <a:sym typeface="+mn-ea"/>
+              </a:rPr>
+              <a:t>v-else-if</a:t>
+            </a:r>
+            <a:r>
+              <a:rPr lang="en-US" altLang="en-US" sz="2400">
+                <a:latin typeface="宋体" panose="02010600030101010101" pitchFamily="2" charset="-122"/>
+                <a:ea typeface="宋体" panose="02010600030101010101" pitchFamily="2" charset="-122"/>
+                <a:sym typeface="+mn-ea"/>
+              </a:rPr>
+              <a:t>	</a:t>
+            </a:r>
+            <a:r>
+              <a:rPr lang="en-US" altLang="en-US" sz="2400">
+                <a:latin typeface="宋体" panose="02010600030101010101" pitchFamily="2" charset="-122"/>
+                <a:ea typeface="宋体" panose="02010600030101010101" pitchFamily="2" charset="-122"/>
+                <a:sym typeface="+mn-ea"/>
+              </a:rPr>
+              <a:t>为</a:t>
+            </a:r>
+            <a:r>
+              <a:rPr lang="en-US" altLang="en-US" sz="2800">
+                <a:sym typeface="+mn-ea"/>
+              </a:rPr>
+              <a:t>v-if</a:t>
+            </a:r>
+            <a:r>
+              <a:rPr lang="en-US" altLang="en-US" sz="2400">
+                <a:latin typeface="宋体" panose="02010600030101010101" pitchFamily="2" charset="-122"/>
+                <a:ea typeface="宋体" panose="02010600030101010101" pitchFamily="2" charset="-122"/>
+                <a:sym typeface="+mn-ea"/>
+              </a:rPr>
+              <a:t>添加一个“</a:t>
+            </a:r>
+            <a:r>
+              <a:rPr lang="en-US" altLang="en-US" sz="2800">
+                <a:sym typeface="+mn-ea"/>
+              </a:rPr>
+              <a:t>else if</a:t>
+            </a:r>
+            <a:r>
+              <a:rPr lang="en-US" altLang="en-US" sz="2400">
+                <a:latin typeface="宋体" panose="02010600030101010101" pitchFamily="2" charset="-122"/>
+                <a:ea typeface="宋体" panose="02010600030101010101" pitchFamily="2" charset="-122"/>
+                <a:sym typeface="+mn-ea"/>
+              </a:rPr>
+              <a:t>块”</a:t>
+            </a:r>
+            <a:endParaRPr lang="en-US" altLang="en-US" sz="2400">
+              <a:latin typeface="宋体" panose="02010600030101010101" pitchFamily="2" charset="-122"/>
+              <a:ea typeface="宋体" panose="02010600030101010101" pitchFamily="2" charset="-122"/>
+              <a:sym typeface="+mn-ea"/>
+            </a:endParaRPr>
+          </a:p>
+          <a:p>
+            <a:r>
+              <a:rPr lang="en-US" altLang="en-US"/>
+              <a:t>v-else	</a:t>
+            </a:r>
+            <a:r>
+              <a:rPr lang="en-US" altLang="en-US" sz="2400">
+                <a:latin typeface="宋体" panose="02010600030101010101" pitchFamily="2" charset="-122"/>
+                <a:ea typeface="宋体" panose="02010600030101010101" pitchFamily="2" charset="-122"/>
+              </a:rPr>
+              <a:t>为</a:t>
+            </a:r>
+            <a:r>
+              <a:rPr lang="en-US" altLang="en-US" sz="2800"/>
+              <a:t>v-if</a:t>
+            </a:r>
+            <a:r>
+              <a:rPr lang="en-US" altLang="en-US" sz="2400">
+                <a:latin typeface="宋体" panose="02010600030101010101" pitchFamily="2" charset="-122"/>
+                <a:ea typeface="宋体" panose="02010600030101010101" pitchFamily="2" charset="-122"/>
+              </a:rPr>
+              <a:t>或</a:t>
+            </a:r>
+            <a:r>
+              <a:rPr lang="en-US" altLang="en-US" sz="2800"/>
+              <a:t>v-else-if</a:t>
+            </a:r>
+            <a:r>
+              <a:rPr lang="en-US" altLang="en-US" sz="2400">
+                <a:latin typeface="宋体" panose="02010600030101010101" pitchFamily="2" charset="-122"/>
+                <a:ea typeface="宋体" panose="02010600030101010101" pitchFamily="2" charset="-122"/>
+              </a:rPr>
+              <a:t>添加一个“</a:t>
+            </a:r>
+            <a:r>
+              <a:rPr lang="en-US" altLang="en-US" sz="2800"/>
+              <a:t>else</a:t>
+            </a:r>
+            <a:r>
+              <a:rPr lang="en-US" altLang="en-US" sz="2400">
+                <a:latin typeface="宋体" panose="02010600030101010101" pitchFamily="2" charset="-122"/>
+                <a:ea typeface="宋体" panose="02010600030101010101" pitchFamily="2" charset="-122"/>
+              </a:rPr>
+              <a:t>块”</a:t>
+            </a:r>
+            <a:endParaRPr lang="en-US" altLang="en-US" sz="2400">
+              <a:latin typeface="宋体" panose="02010600030101010101" pitchFamily="2" charset="-122"/>
+              <a:ea typeface="宋体" panose="02010600030101010101" pitchFamily="2" charset="-122"/>
+            </a:endParaRPr>
+          </a:p>
+          <a:p>
+            <a:r>
+              <a:rPr lang="en-US" altLang="en-US">
+                <a:sym typeface="+mn-ea"/>
+              </a:rPr>
+              <a:t>v-show	</a:t>
+            </a:r>
+            <a:r>
+              <a:rPr lang="en-US" altLang="en-US" sz="2400">
+                <a:latin typeface="宋体" panose="02010600030101010101" pitchFamily="2" charset="-122"/>
+                <a:ea typeface="宋体" panose="02010600030101010101" pitchFamily="2" charset="-122"/>
+                <a:sym typeface="+mn-ea"/>
+              </a:rPr>
+              <a:t>条件渲染指令，</a:t>
+            </a:r>
+            <a:r>
+              <a:rPr lang="en-US" altLang="en-US" sz="2400">
+                <a:latin typeface="宋体" panose="02010600030101010101" pitchFamily="2" charset="-122"/>
+                <a:ea typeface="宋体" panose="02010600030101010101" pitchFamily="2" charset="-122"/>
+                <a:sym typeface="+mn-ea"/>
+              </a:rPr>
+              <a:t>它根据表达式的真假为元素设置CSS的</a:t>
+            </a:r>
+            <a:r>
+              <a:rPr lang="en-US" altLang="en-US" sz="2800">
+                <a:sym typeface="+mn-ea"/>
+              </a:rPr>
+              <a:t>style</a:t>
+            </a:r>
+            <a:r>
+              <a:rPr lang="en-US" altLang="en-US" sz="2400">
+                <a:latin typeface="宋体" panose="02010600030101010101" pitchFamily="2" charset="-122"/>
+                <a:ea typeface="宋体" panose="02010600030101010101" pitchFamily="2" charset="-122"/>
+                <a:sym typeface="+mn-ea"/>
+              </a:rPr>
+              <a:t>属性</a:t>
+            </a:r>
+            <a:endParaRPr lang="zh-CN" altLang="en-US"/>
+          </a:p>
+          <a:p>
+            <a:r>
+              <a:rPr lang="en-US" altLang="en-US"/>
+              <a:t>v-for		</a:t>
+            </a:r>
+            <a:r>
+              <a:rPr lang="en-US" altLang="en-US" sz="2400">
+                <a:latin typeface="宋体" panose="02010600030101010101" pitchFamily="2" charset="-122"/>
+                <a:ea typeface="宋体" panose="02010600030101010101" pitchFamily="2" charset="-122"/>
+              </a:rPr>
+              <a:t>基于一个数组渲染一个列表</a:t>
+            </a:r>
+            <a:r>
+              <a:rPr lang="zh-CN" altLang="en-US" sz="2400">
+                <a:latin typeface="宋体" panose="02010600030101010101" pitchFamily="2" charset="-122"/>
+                <a:ea typeface="宋体" panose="02010600030101010101" pitchFamily="2" charset="-122"/>
+              </a:rPr>
+              <a:t>，类似</a:t>
+            </a:r>
+            <a:r>
+              <a:rPr lang="en-US" altLang="en-US" sz="2800"/>
+              <a:t>JavaScript</a:t>
+            </a:r>
+            <a:r>
+              <a:rPr lang="en-US" altLang="en-US" sz="2400">
+                <a:latin typeface="宋体" panose="02010600030101010101" pitchFamily="2" charset="-122"/>
+                <a:ea typeface="宋体" panose="02010600030101010101" pitchFamily="2" charset="-122"/>
+              </a:rPr>
+              <a:t>的遍历语法</a:t>
+            </a:r>
+            <a:endParaRPr lang="en-US" altLang="en-US" sz="2400">
+              <a:latin typeface="宋体" panose="02010600030101010101" pitchFamily="2" charset="-122"/>
+              <a:ea typeface="宋体" panose="02010600030101010101" pitchFamily="2" charset="-122"/>
+            </a:endParaRPr>
+          </a:p>
+          <a:p>
+            <a:r>
+              <a:rPr lang="en-US" altLang="en-US"/>
+              <a:t>v-bind	</a:t>
+            </a:r>
+            <a:r>
+              <a:rPr lang="en-US" altLang="en-US" sz="2400">
+                <a:latin typeface="宋体" panose="02010600030101010101" pitchFamily="2" charset="-122"/>
+                <a:ea typeface="宋体" panose="02010600030101010101" pitchFamily="2" charset="-122"/>
+              </a:rPr>
+              <a:t>通常设置</a:t>
+            </a:r>
+            <a:r>
+              <a:rPr lang="en-US" altLang="en-US" sz="2800"/>
+              <a:t>HTML</a:t>
+            </a:r>
+            <a:r>
+              <a:rPr lang="en-US" altLang="en-US" sz="2400">
+                <a:latin typeface="宋体" panose="02010600030101010101" pitchFamily="2" charset="-122"/>
+                <a:ea typeface="宋体" panose="02010600030101010101" pitchFamily="2" charset="-122"/>
+              </a:rPr>
+              <a:t>元素的特性（</a:t>
+            </a:r>
+            <a:r>
+              <a:rPr lang="en-US" altLang="en-US" sz="2800"/>
+              <a:t>attribute</a:t>
+            </a:r>
+            <a:r>
+              <a:rPr lang="en-US" altLang="en-US" sz="2400">
+                <a:latin typeface="宋体" panose="02010600030101010101" pitchFamily="2" charset="-122"/>
+                <a:ea typeface="宋体" panose="02010600030101010101" pitchFamily="2" charset="-122"/>
+              </a:rPr>
+              <a:t>）</a:t>
+            </a:r>
+            <a:endParaRPr lang="zh-CN" altLang="en-US"/>
+          </a:p>
+          <a:p>
+            <a:r>
+              <a:rPr lang="en-US" altLang="en-US"/>
+              <a:t>v-on		</a:t>
+            </a:r>
+            <a:r>
+              <a:rPr lang="en-US" altLang="en-US" sz="2400">
+                <a:latin typeface="宋体" panose="02010600030101010101" pitchFamily="2" charset="-122"/>
+                <a:ea typeface="宋体" panose="02010600030101010101" pitchFamily="2" charset="-122"/>
+              </a:rPr>
+              <a:t>监听</a:t>
+            </a:r>
+            <a:r>
+              <a:rPr lang="en-US" altLang="en-US" sz="2800"/>
+              <a:t>DOM</a:t>
+            </a:r>
+            <a:r>
+              <a:rPr lang="en-US" altLang="en-US" sz="2400">
+                <a:latin typeface="宋体" panose="02010600030101010101" pitchFamily="2" charset="-122"/>
+                <a:ea typeface="宋体" panose="02010600030101010101" pitchFamily="2" charset="-122"/>
+              </a:rPr>
+              <a:t>事件</a:t>
+            </a:r>
+            <a:endParaRPr lang="en-US" altLang="en-US"/>
+          </a:p>
+        </p:txBody>
+      </p:sp>
+    </p:spTree>
+  </p:cSld>
+  <p:clrMapOvr>
+    <a:masterClrMapping/>
+  </p:clrMapOvr>
+</p:sld>
+</file>
+
+<file path=ppt/slides/slide13.xml><?xml version="1.0" encoding="utf-8"?>
+<p:sld xmlns:a="http://schemas.openxmlformats.org/drawingml/2006/main" xmlns:r="http://schemas.openxmlformats.org/officeDocument/2006/relationships" xmlns:p="http://schemas.openxmlformats.org/presentationml/2006/main">
+  <p:cSld>
+    <p:spTree>
+      <p:nvGrpSpPr>
+        <p:cNvPr id="1" name=""/>
+        <p:cNvGrpSpPr/>
+        <p:nvPr/>
+      </p:nvGrpSpPr>
+      <p:grpSpPr/>
+      <p:sp>
+        <p:nvSpPr>
+          <p:cNvPr id="2" name="标题 1"/>
+          <p:cNvSpPr>
+            <a:spLocks noGrp="1"/>
+          </p:cNvSpPr>
+          <p:nvPr>
+            <p:ph type="title"/>
+          </p:nvPr>
+        </p:nvSpPr>
+        <p:spPr/>
+        <p:txBody>
+          <a:bodyPr/>
+          <a:p>
+            <a:r>
+              <a:rPr lang="en-US" altLang="zh-CN">
+                <a:latin typeface="楷体" panose="02010609060101010101" charset="-122"/>
+                <a:ea typeface="楷体" panose="02010609060101010101" charset="-122"/>
+              </a:rPr>
+              <a:t>v-if</a:t>
+            </a:r>
+            <a:r>
+              <a:rPr lang="zh-CN" altLang="en-US">
+                <a:latin typeface="楷体" panose="02010609060101010101" charset="-122"/>
+                <a:ea typeface="楷体" panose="02010609060101010101" charset="-122"/>
+              </a:rPr>
+              <a:t>指令：</a:t>
+            </a:r>
+            <a:endParaRPr lang="zh-CN" altLang="en-US">
+              <a:latin typeface="楷体" panose="02010609060101010101" charset="-122"/>
+              <a:ea typeface="楷体" panose="02010609060101010101" charset="-122"/>
+            </a:endParaRPr>
+          </a:p>
+        </p:txBody>
+      </p:sp>
+      <p:sp>
+        <p:nvSpPr>
+          <p:cNvPr id="3" name="内容占位符 2"/>
+          <p:cNvSpPr>
+            <a:spLocks noGrp="1"/>
+          </p:cNvSpPr>
+          <p:nvPr>
+            <p:ph idx="1"/>
+          </p:nvPr>
+        </p:nvSpPr>
+        <p:spPr>
+          <a:xfrm>
+            <a:off x="772160" y="1691640"/>
+            <a:ext cx="10515600" cy="4543425"/>
+          </a:xfrm>
+        </p:spPr>
+        <p:txBody>
+          <a:bodyPr>
+            <a:normAutofit lnSpcReduction="20000"/>
+          </a:bodyPr>
+          <a:p>
+            <a:pPr marL="0" indent="0" fontAlgn="auto">
+              <a:lnSpc>
+                <a:spcPct val="100000"/>
+              </a:lnSpc>
+              <a:buNone/>
+            </a:pPr>
+            <a:r>
+              <a:rPr lang="en-US" altLang="zh-CN"/>
+              <a:t>	</a:t>
+            </a:r>
+            <a:r>
+              <a:rPr lang="zh-CN" altLang="en-US"/>
+              <a:t>v-if是条件渲染指令，它根据表达式的真假来删除和插入元素，它的基本语法如下：</a:t>
+            </a:r>
+            <a:endParaRPr lang="zh-CN" altLang="en-US"/>
+          </a:p>
+          <a:p>
+            <a:pPr marL="0" indent="0" fontAlgn="auto">
+              <a:lnSpc>
+                <a:spcPct val="100000"/>
+              </a:lnSpc>
+              <a:buNone/>
+            </a:pPr>
+            <a:r>
+              <a:rPr lang="en-US" altLang="zh-CN"/>
+              <a:t>	</a:t>
+            </a:r>
+            <a:r>
+              <a:rPr lang="zh-CN" altLang="en-US"/>
+              <a:t>v-if="expression"</a:t>
+            </a:r>
+            <a:endParaRPr lang="zh-CN" altLang="en-US"/>
+          </a:p>
+          <a:p>
+            <a:pPr marL="0" indent="0" fontAlgn="auto">
+              <a:lnSpc>
+                <a:spcPct val="100000"/>
+              </a:lnSpc>
+              <a:buNone/>
+            </a:pPr>
+            <a:r>
+              <a:rPr lang="en-US" altLang="zh-CN"/>
+              <a:t>	</a:t>
+            </a:r>
+            <a:r>
+              <a:rPr lang="zh-CN" altLang="en-US"/>
+              <a:t>expression是一个返回bool值的表达式，表达式可以是一个bool属性，也可以是一个返回bool的运算式。</a:t>
+            </a:r>
+            <a:endParaRPr lang="zh-CN" altLang="en-US"/>
+          </a:p>
+          <a:p>
+            <a:pPr marL="0" indent="0">
+              <a:buNone/>
+            </a:pPr>
+            <a:r>
+              <a:rPr lang="en-US" altLang="zh-CN" sz="1800"/>
+              <a:t>	expression==true  			</a:t>
+            </a:r>
+            <a:r>
+              <a:rPr lang="zh-CN" altLang="zh-CN" sz="1800"/>
+              <a:t>插入</a:t>
+            </a:r>
+            <a:r>
+              <a:rPr lang="en-US" altLang="zh-CN" sz="1800"/>
+              <a:t>DOM</a:t>
+            </a:r>
+            <a:r>
+              <a:rPr lang="zh-CN" altLang="en-US" sz="1800"/>
+              <a:t>；</a:t>
+            </a:r>
+            <a:endParaRPr lang="zh-CN" altLang="en-US" sz="1800"/>
+          </a:p>
+          <a:p>
+            <a:pPr marL="0" indent="0">
+              <a:buNone/>
+            </a:pPr>
+            <a:r>
+              <a:rPr lang="en-US" altLang="zh-CN" sz="1800"/>
+              <a:t>	</a:t>
+            </a:r>
+            <a:r>
+              <a:rPr lang="en-US" altLang="zh-CN" sz="1800">
+                <a:sym typeface="+mn-ea"/>
+              </a:rPr>
+              <a:t>expression==false</a:t>
+            </a:r>
+            <a:r>
+              <a:rPr lang="zh-CN" altLang="zh-CN" sz="1800">
+                <a:sym typeface="+mn-ea"/>
+              </a:rPr>
+              <a:t> </a:t>
+            </a:r>
+            <a:r>
+              <a:rPr lang="en-US" altLang="zh-CN" sz="1800">
+                <a:sym typeface="+mn-ea"/>
+              </a:rPr>
+              <a:t>			</a:t>
+            </a:r>
+            <a:r>
+              <a:rPr lang="zh-CN" altLang="zh-CN" sz="1800">
+                <a:sym typeface="+mn-ea"/>
+              </a:rPr>
+              <a:t>删除</a:t>
+            </a:r>
+            <a:r>
+              <a:rPr lang="en-US" altLang="zh-CN" sz="1800">
+                <a:sym typeface="+mn-ea"/>
+              </a:rPr>
+              <a:t>DOM</a:t>
+            </a:r>
+            <a:r>
+              <a:rPr lang="zh-CN" altLang="en-US" sz="1800">
+                <a:sym typeface="+mn-ea"/>
+              </a:rPr>
+              <a:t>；</a:t>
+            </a:r>
+            <a:endParaRPr lang="zh-CN" altLang="en-US" sz="1800">
+              <a:sym typeface="+mn-ea"/>
+            </a:endParaRPr>
+          </a:p>
+          <a:p>
+            <a:pPr marL="0" indent="0">
+              <a:buNone/>
+            </a:pPr>
+            <a:r>
+              <a:rPr lang="en-US" altLang="zh-CN" sz="1800">
+                <a:sym typeface="+mn-ea"/>
+              </a:rPr>
+              <a:t>	expression==”adadaqweq”  		</a:t>
+            </a:r>
+            <a:r>
+              <a:rPr lang="zh-CN" altLang="zh-CN" sz="1800">
+                <a:sym typeface="+mn-ea"/>
+              </a:rPr>
+              <a:t>插入</a:t>
+            </a:r>
+            <a:r>
+              <a:rPr lang="en-US" altLang="zh-CN" sz="1800">
+                <a:sym typeface="+mn-ea"/>
+              </a:rPr>
+              <a:t>DOM</a:t>
+            </a:r>
+            <a:r>
+              <a:rPr lang="zh-CN" altLang="en-US" sz="1800">
+                <a:sym typeface="+mn-ea"/>
+              </a:rPr>
+              <a:t>；</a:t>
+            </a:r>
+            <a:endParaRPr lang="zh-CN" altLang="en-US" sz="1800">
+              <a:sym typeface="+mn-ea"/>
+            </a:endParaRPr>
+          </a:p>
+          <a:p>
+            <a:pPr marL="0" indent="0">
+              <a:buNone/>
+            </a:pPr>
+            <a:r>
+              <a:rPr lang="en-US" altLang="zh-CN" sz="1800">
+                <a:sym typeface="+mn-ea"/>
+              </a:rPr>
+              <a:t>	expression==”” 			</a:t>
+            </a:r>
+            <a:r>
+              <a:rPr lang="zh-CN" altLang="zh-CN" sz="1800">
+                <a:sym typeface="+mn-ea"/>
+              </a:rPr>
+              <a:t>删除</a:t>
+            </a:r>
+            <a:r>
+              <a:rPr lang="en-US" altLang="zh-CN" sz="1800">
+                <a:sym typeface="+mn-ea"/>
+              </a:rPr>
+              <a:t>DOM</a:t>
+            </a:r>
+            <a:r>
+              <a:rPr lang="zh-CN" altLang="en-US" sz="1800">
+                <a:sym typeface="+mn-ea"/>
+              </a:rPr>
+              <a:t>；</a:t>
+            </a:r>
+            <a:endParaRPr lang="en-US" altLang="zh-CN" sz="1800">
+              <a:sym typeface="+mn-ea"/>
+            </a:endParaRPr>
+          </a:p>
+          <a:p>
+            <a:pPr marL="0" indent="0">
+              <a:buNone/>
+            </a:pPr>
+            <a:r>
+              <a:rPr lang="en-US" altLang="zh-CN"/>
+              <a:t>	v-if指令是根据条件表达式的值来执行元素的插入或者删除行为。</a:t>
+            </a:r>
+            <a:endParaRPr lang="en-US" altLang="zh-CN"/>
+          </a:p>
+        </p:txBody>
+      </p:sp>
+    </p:spTree>
+  </p:cSld>
+  <p:clrMapOvr>
+    <a:masterClrMapping/>
+  </p:clrMapOvr>
+</p:sld>
+</file>
+
+<file path=ppt/slides/slide14.xml><?xml version="1.0" encoding="utf-8"?>
+<p:sld xmlns:a="http://schemas.openxmlformats.org/drawingml/2006/main" xmlns:r="http://schemas.openxmlformats.org/officeDocument/2006/relationships" xmlns:p="http://schemas.openxmlformats.org/presentationml/2006/main">
+  <p:cSld>
+    <p:spTree>
+      <p:nvGrpSpPr>
+        <p:cNvPr id="1" name=""/>
+        <p:cNvGrpSpPr/>
+        <p:nvPr/>
+      </p:nvGrpSpPr>
+      <p:grpSpPr/>
+      <p:sp>
+        <p:nvSpPr>
+          <p:cNvPr id="2" name="标题 1"/>
+          <p:cNvSpPr>
+            <a:spLocks noGrp="1"/>
+          </p:cNvSpPr>
+          <p:nvPr>
+            <p:ph type="title"/>
+          </p:nvPr>
+        </p:nvSpPr>
+        <p:spPr/>
+        <p:txBody>
+          <a:bodyPr/>
+          <a:p>
+            <a:r>
+              <a:rPr lang="en-US" altLang="zh-CN">
+                <a:latin typeface="楷体" panose="02010609060101010101" charset="-122"/>
+                <a:ea typeface="楷体" panose="02010609060101010101" charset="-122"/>
+              </a:rPr>
+              <a:t>v-else-if</a:t>
+            </a:r>
+            <a:r>
+              <a:rPr lang="zh-CN" altLang="en-US">
+                <a:latin typeface="楷体" panose="02010609060101010101" charset="-122"/>
+                <a:ea typeface="楷体" panose="02010609060101010101" charset="-122"/>
+              </a:rPr>
+              <a:t>指令：</a:t>
+            </a:r>
+            <a:endParaRPr lang="zh-CN" altLang="en-US">
+              <a:latin typeface="楷体" panose="02010609060101010101" charset="-122"/>
+              <a:ea typeface="楷体" panose="02010609060101010101" charset="-122"/>
+            </a:endParaRPr>
+          </a:p>
+        </p:txBody>
+      </p:sp>
+      <p:sp>
+        <p:nvSpPr>
+          <p:cNvPr id="3" name="内容占位符 2"/>
+          <p:cNvSpPr>
+            <a:spLocks noGrp="1"/>
+          </p:cNvSpPr>
+          <p:nvPr>
+            <p:ph idx="1"/>
+          </p:nvPr>
+        </p:nvSpPr>
+        <p:spPr>
+          <a:xfrm>
+            <a:off x="838200" y="2188210"/>
+            <a:ext cx="10515600" cy="4351338"/>
+          </a:xfrm>
+        </p:spPr>
+        <p:txBody>
+          <a:bodyPr>
+            <a:normAutofit lnSpcReduction="20000"/>
+          </a:bodyPr>
+          <a:p>
+            <a:pPr marL="0" indent="0" fontAlgn="auto">
+              <a:lnSpc>
+                <a:spcPct val="100000"/>
+              </a:lnSpc>
+              <a:buNone/>
+            </a:pPr>
+            <a:r>
+              <a:rPr lang="en-US" altLang="zh-CN"/>
+              <a:t>	</a:t>
+            </a:r>
+            <a:r>
+              <a:rPr lang="en-US" altLang="zh-CN">
+                <a:sym typeface="+mn-ea"/>
+              </a:rPr>
+              <a:t>v-else-if指令为v-if</a:t>
+            </a:r>
+            <a:r>
+              <a:rPr lang="zh-CN" altLang="zh-CN">
+                <a:sym typeface="+mn-ea"/>
+              </a:rPr>
+              <a:t>或v-else-if</a:t>
+            </a:r>
+            <a:r>
+              <a:rPr lang="en-US" altLang="zh-CN">
+                <a:sym typeface="+mn-ea"/>
+              </a:rPr>
+              <a:t>添加一个“else-if块”。v-else-if元素必须立即跟在v-if</a:t>
+            </a:r>
+            <a:r>
+              <a:rPr lang="zh-CN" altLang="zh-CN">
+                <a:sym typeface="+mn-ea"/>
+              </a:rPr>
+              <a:t>或v-else-if元素</a:t>
+            </a:r>
+            <a:r>
+              <a:rPr lang="en-US" altLang="zh-CN">
+                <a:sym typeface="+mn-ea"/>
+              </a:rPr>
+              <a:t>的后面</a:t>
+            </a:r>
+            <a:r>
+              <a:rPr lang="zh-CN" altLang="zh-CN">
+                <a:sym typeface="+mn-ea"/>
+              </a:rPr>
+              <a:t>，</a:t>
+            </a:r>
+            <a:r>
+              <a:rPr lang="en-US" altLang="zh-CN">
+                <a:sym typeface="+mn-ea"/>
+              </a:rPr>
+              <a:t>否则它不能被识别。</a:t>
+            </a:r>
+            <a:endParaRPr lang="en-US" altLang="zh-CN"/>
+          </a:p>
+        </p:txBody>
+      </p:sp>
+    </p:spTree>
+  </p:cSld>
+  <p:clrMapOvr>
+    <a:masterClrMapping/>
+  </p:clrMapOvr>
+</p:sld>
+</file>
+
+<file path=ppt/slides/slide15.xml><?xml version="1.0" encoding="utf-8"?>
+<p:sld xmlns:a="http://schemas.openxmlformats.org/drawingml/2006/main" xmlns:r="http://schemas.openxmlformats.org/officeDocument/2006/relationships" xmlns:p="http://schemas.openxmlformats.org/presentationml/2006/main">
+  <p:cSld>
+    <p:spTree>
+      <p:nvGrpSpPr>
+        <p:cNvPr id="1" name=""/>
+        <p:cNvGrpSpPr/>
+        <p:nvPr/>
+      </p:nvGrpSpPr>
+      <p:grpSpPr/>
+      <p:sp>
+        <p:nvSpPr>
+          <p:cNvPr id="2" name="标题 1"/>
+          <p:cNvSpPr>
+            <a:spLocks noGrp="1"/>
+          </p:cNvSpPr>
+          <p:nvPr>
+            <p:ph type="title"/>
+          </p:nvPr>
+        </p:nvSpPr>
+        <p:spPr/>
+        <p:txBody>
+          <a:bodyPr/>
+          <a:p>
+            <a:r>
+              <a:rPr lang="en-US" altLang="zh-CN">
+                <a:latin typeface="楷体" panose="02010609060101010101" charset="-122"/>
+                <a:ea typeface="楷体" panose="02010609060101010101" charset="-122"/>
+              </a:rPr>
+              <a:t>v-else</a:t>
+            </a:r>
+            <a:r>
+              <a:rPr lang="zh-CN" altLang="zh-CN">
+                <a:latin typeface="楷体" panose="02010609060101010101" charset="-122"/>
+                <a:ea typeface="楷体" panose="02010609060101010101" charset="-122"/>
+              </a:rPr>
+              <a:t>指令：</a:t>
+            </a:r>
+            <a:endParaRPr lang="zh-CN" altLang="zh-CN">
+              <a:latin typeface="楷体" panose="02010609060101010101" charset="-122"/>
+              <a:ea typeface="楷体" panose="02010609060101010101" charset="-122"/>
+            </a:endParaRPr>
+          </a:p>
+        </p:txBody>
+      </p:sp>
+      <p:sp>
+        <p:nvSpPr>
+          <p:cNvPr id="3" name="内容占位符 2"/>
+          <p:cNvSpPr>
+            <a:spLocks noGrp="1"/>
+          </p:cNvSpPr>
+          <p:nvPr>
+            <p:ph idx="1"/>
+          </p:nvPr>
+        </p:nvSpPr>
+        <p:spPr/>
+        <p:txBody>
+          <a:bodyPr/>
+          <a:p>
+            <a:pPr marL="0" indent="0">
+              <a:buNone/>
+            </a:pPr>
+            <a:r>
+              <a:rPr lang="en-US" altLang="zh-CN"/>
+              <a:t>	v-else指令为v-if</a:t>
+            </a:r>
+            <a:r>
+              <a:rPr lang="zh-CN" altLang="zh-CN"/>
+              <a:t>或v-else-if</a:t>
+            </a:r>
+            <a:r>
+              <a:rPr lang="en-US" altLang="zh-CN"/>
+              <a:t>添加一个“else块”。v-else元素必须立即跟在v-if</a:t>
+            </a:r>
+            <a:r>
+              <a:rPr lang="zh-CN" altLang="zh-CN">
+                <a:sym typeface="+mn-ea"/>
+              </a:rPr>
+              <a:t>或v-else-if元素</a:t>
+            </a:r>
+            <a:r>
+              <a:rPr lang="en-US" altLang="zh-CN"/>
+              <a:t>的后面</a:t>
+            </a:r>
+            <a:r>
+              <a:rPr lang="zh-CN" altLang="en-US"/>
+              <a:t>，</a:t>
+            </a:r>
+            <a:r>
+              <a:rPr lang="en-US" altLang="zh-CN"/>
+              <a:t>否则它不能被识别。</a:t>
+            </a:r>
+            <a:endParaRPr lang="en-US" altLang="zh-CN"/>
+          </a:p>
+        </p:txBody>
+      </p:sp>
+    </p:spTree>
+  </p:cSld>
+  <p:clrMapOvr>
+    <a:masterClrMapping/>
+  </p:clrMapOvr>
+</p:sld>
+</file>
+
+<file path=ppt/slides/slide16.xml><?xml version="1.0" encoding="utf-8"?>
+<p:sld xmlns:a="http://schemas.openxmlformats.org/drawingml/2006/main" xmlns:r="http://schemas.openxmlformats.org/officeDocument/2006/relationships" xmlns:p="http://schemas.openxmlformats.org/presentationml/2006/main">
+  <p:cSld>
+    <p:spTree>
+      <p:nvGrpSpPr>
+        <p:cNvPr id="1" name=""/>
+        <p:cNvGrpSpPr/>
+        <p:nvPr/>
+      </p:nvGrpSpPr>
+      <p:grpSpPr/>
+      <p:sp>
+        <p:nvSpPr>
+          <p:cNvPr id="2" name="标题 1"/>
+          <p:cNvSpPr>
+            <a:spLocks noGrp="1"/>
+          </p:cNvSpPr>
+          <p:nvPr>
+            <p:ph type="title"/>
+          </p:nvPr>
+        </p:nvSpPr>
+        <p:spPr/>
+        <p:txBody>
+          <a:bodyPr/>
+          <a:p>
+            <a:r>
+              <a:rPr lang="en-US" altLang="zh-CN">
+                <a:latin typeface="楷体" panose="02010609060101010101" charset="-122"/>
+                <a:ea typeface="楷体" panose="02010609060101010101" charset="-122"/>
+              </a:rPr>
+              <a:t>v-show</a:t>
+            </a:r>
+            <a:r>
+              <a:rPr lang="zh-CN" altLang="en-US">
+                <a:latin typeface="楷体" panose="02010609060101010101" charset="-122"/>
+                <a:ea typeface="楷体" panose="02010609060101010101" charset="-122"/>
+              </a:rPr>
+              <a:t>指令：</a:t>
+            </a:r>
+            <a:endParaRPr lang="zh-CN" altLang="en-US">
+              <a:latin typeface="楷体" panose="02010609060101010101" charset="-122"/>
+              <a:ea typeface="楷体" panose="02010609060101010101" charset="-122"/>
+            </a:endParaRPr>
+          </a:p>
+        </p:txBody>
+      </p:sp>
+      <p:sp>
+        <p:nvSpPr>
+          <p:cNvPr id="3" name="内容占位符 2"/>
+          <p:cNvSpPr>
+            <a:spLocks noGrp="1"/>
+          </p:cNvSpPr>
+          <p:nvPr>
+            <p:ph idx="1"/>
+          </p:nvPr>
+        </p:nvSpPr>
+        <p:spPr/>
+        <p:txBody>
+          <a:bodyPr/>
+          <a:p>
+            <a:pPr marL="0" indent="0">
+              <a:buNone/>
+            </a:pPr>
+            <a:r>
+              <a:rPr lang="en-US" altLang="zh-CN"/>
+              <a:t>	v-show也是条件渲染指令，和v-if指令不同的是，使用v-show指令的元素始终会被渲染到HTML，它只是简单地为元素设置CSS的style属性。</a:t>
+            </a:r>
+            <a:endParaRPr lang="en-US" altLang="zh-CN"/>
+          </a:p>
+        </p:txBody>
+      </p:sp>
+    </p:spTree>
+  </p:cSld>
+  <p:clrMapOvr>
+    <a:masterClrMapping/>
+  </p:clrMapOvr>
+</p:sld>
+</file>
+
+<file path=ppt/slides/slide17.xml><?xml version="1.0" encoding="utf-8"?>
+<p:sld xmlns:a="http://schemas.openxmlformats.org/drawingml/2006/main" xmlns:r="http://schemas.openxmlformats.org/officeDocument/2006/relationships" xmlns:p="http://schemas.openxmlformats.org/presentationml/2006/main">
+  <p:cSld>
+    <p:spTree>
+      <p:nvGrpSpPr>
+        <p:cNvPr id="1" name=""/>
+        <p:cNvGrpSpPr/>
+        <p:nvPr/>
+      </p:nvGrpSpPr>
+      <p:grpSpPr/>
+      <p:sp>
+        <p:nvSpPr>
+          <p:cNvPr id="2" name="标题 1"/>
+          <p:cNvSpPr>
+            <a:spLocks noGrp="1"/>
+          </p:cNvSpPr>
+          <p:nvPr>
+            <p:ph type="title"/>
+          </p:nvPr>
+        </p:nvSpPr>
+        <p:spPr/>
+        <p:txBody>
+          <a:bodyPr/>
+          <a:p>
+            <a:r>
+              <a:rPr lang="en-US" altLang="zh-CN"/>
+              <a:t>v-for</a:t>
+            </a:r>
+            <a:r>
+              <a:rPr lang="zh-CN" altLang="zh-CN"/>
+              <a:t>指令：</a:t>
+            </a:r>
+            <a:endParaRPr lang="zh-CN" altLang="zh-CN"/>
+          </a:p>
+        </p:txBody>
+      </p:sp>
+      <p:sp>
+        <p:nvSpPr>
+          <p:cNvPr id="3" name="内容占位符 2"/>
+          <p:cNvSpPr>
+            <a:spLocks noGrp="1"/>
+          </p:cNvSpPr>
+          <p:nvPr>
+            <p:ph idx="1"/>
+          </p:nvPr>
+        </p:nvSpPr>
+        <p:spPr/>
+        <p:txBody>
+          <a:bodyPr/>
+          <a:p>
+            <a:r>
+              <a:rPr lang="zh-CN" altLang="en-US"/>
+              <a:t>v-for指令基于一个数组渲染一个列表，它和JavaScript的遍历语法相似：</a:t>
+            </a:r>
+            <a:endParaRPr lang="zh-CN" altLang="en-US"/>
+          </a:p>
+          <a:p>
+            <a:pPr marL="0" indent="0">
+              <a:buNone/>
+            </a:pPr>
+            <a:r>
+              <a:rPr lang="en-US" altLang="zh-CN"/>
+              <a:t>	</a:t>
+            </a:r>
+            <a:r>
+              <a:rPr lang="zh-CN" altLang="en-US"/>
+              <a:t>v-for="item in items"</a:t>
+            </a:r>
+            <a:endParaRPr lang="zh-CN" altLang="en-US"/>
+          </a:p>
+          <a:p>
+            <a:r>
+              <a:rPr lang="zh-CN" altLang="en-US"/>
+              <a:t>items是一个数组，item是当前被遍历的数组元素。</a:t>
+            </a:r>
+            <a:endParaRPr lang="zh-CN" altLang="en-US"/>
+          </a:p>
+        </p:txBody>
+      </p:sp>
+    </p:spTree>
+  </p:cSld>
+  <p:clrMapOvr>
+    <a:masterClrMapping/>
+  </p:clrMapOvr>
+</p:sld>
+</file>
+
+<file path=ppt/slides/slide18.xml><?xml version="1.0" encoding="utf-8"?>
+<p:sld xmlns:a="http://schemas.openxmlformats.org/drawingml/2006/main" xmlns:r="http://schemas.openxmlformats.org/officeDocument/2006/relationships" xmlns:p="http://schemas.openxmlformats.org/presentationml/2006/main">
+  <p:cSld>
+    <p:spTree>
+      <p:nvGrpSpPr>
+        <p:cNvPr id="1" name=""/>
+        <p:cNvGrpSpPr/>
+        <p:nvPr/>
+      </p:nvGrpSpPr>
+      <p:grpSpPr/>
+      <p:sp>
+        <p:nvSpPr>
+          <p:cNvPr id="2" name="标题 1"/>
+          <p:cNvSpPr>
+            <a:spLocks noGrp="1"/>
+          </p:cNvSpPr>
+          <p:nvPr>
+            <p:ph type="title"/>
+          </p:nvPr>
+        </p:nvSpPr>
+        <p:spPr/>
+        <p:txBody>
+          <a:bodyPr/>
+          <a:p>
+            <a:r>
+              <a:rPr lang="en-US" altLang="zh-CN"/>
+              <a:t>v-bind</a:t>
+            </a:r>
+            <a:r>
+              <a:rPr lang="zh-CN" altLang="zh-CN"/>
+              <a:t>指令：</a:t>
+            </a:r>
+            <a:endParaRPr lang="zh-CN" altLang="zh-CN"/>
+          </a:p>
+        </p:txBody>
+      </p:sp>
+      <p:sp>
+        <p:nvSpPr>
+          <p:cNvPr id="3" name="内容占位符 2"/>
+          <p:cNvSpPr>
+            <a:spLocks noGrp="1"/>
+          </p:cNvSpPr>
+          <p:nvPr>
+            <p:ph idx="1"/>
+          </p:nvPr>
+        </p:nvSpPr>
+        <p:spPr/>
+        <p:txBody>
+          <a:bodyPr/>
+          <a:p>
+            <a:r>
+              <a:rPr lang="zh-CN" altLang="en-US"/>
+              <a:t>动态地绑定一个或多个特性</a:t>
+            </a:r>
+            <a:r>
+              <a:rPr lang="en-US" altLang="zh-CN"/>
+              <a:t>(</a:t>
+            </a:r>
+            <a:r>
+              <a:rPr lang="en-US" altLang="zh-CN">
+                <a:sym typeface="+mn-ea"/>
+              </a:rPr>
+              <a:t>attribute</a:t>
+            </a:r>
+            <a:r>
+              <a:rPr lang="en-US" altLang="zh-CN"/>
+              <a:t>)</a:t>
+            </a:r>
+            <a:r>
+              <a:rPr lang="zh-CN" altLang="en-US"/>
+              <a:t>，或一个组件 prop 到表达式</a:t>
+            </a:r>
+            <a:endParaRPr lang="zh-CN" altLang="en-US"/>
+          </a:p>
+          <a:p>
+            <a:pPr lvl="1"/>
+            <a:r>
+              <a:rPr lang="zh-CN" altLang="en-US"/>
+              <a:t>v-bind:</a:t>
+            </a:r>
+            <a:r>
+              <a:rPr lang="en-US" altLang="zh-CN"/>
+              <a:t>argument</a:t>
+            </a:r>
+            <a:r>
+              <a:rPr lang="zh-CN" altLang="en-US"/>
+              <a:t>="</a:t>
+            </a:r>
+            <a:r>
+              <a:rPr lang="zh-CN" altLang="en-US">
+                <a:sym typeface="+mn-ea"/>
+              </a:rPr>
+              <a:t>expression</a:t>
+            </a:r>
+            <a:r>
+              <a:rPr lang="zh-CN" altLang="en-US"/>
+              <a:t>"</a:t>
+            </a:r>
+            <a:endParaRPr lang="zh-CN" altLang="en-US"/>
+          </a:p>
+          <a:p>
+            <a:pPr lvl="1"/>
+            <a:r>
+              <a:rPr lang="en-US" altLang="zh-CN"/>
+              <a:t>:</a:t>
+            </a:r>
+            <a:r>
+              <a:rPr lang="en-US" altLang="zh-CN">
+                <a:sym typeface="+mn-ea"/>
+              </a:rPr>
+              <a:t>argument</a:t>
+            </a:r>
+            <a:r>
+              <a:rPr lang="zh-CN" altLang="en-US">
+                <a:sym typeface="+mn-ea"/>
+              </a:rPr>
+              <a:t>="</a:t>
+            </a:r>
+            <a:r>
+              <a:rPr lang="zh-CN" altLang="en-US">
+                <a:sym typeface="+mn-ea"/>
+              </a:rPr>
+              <a:t>expression</a:t>
+            </a:r>
+            <a:r>
+              <a:rPr lang="zh-CN" altLang="en-US">
+                <a:sym typeface="+mn-ea"/>
+              </a:rPr>
+              <a:t>"        </a:t>
+            </a:r>
+            <a:r>
+              <a:rPr lang="en-US" altLang="zh-CN">
+                <a:sym typeface="+mn-ea"/>
+              </a:rPr>
+              <a:t>--</a:t>
+            </a:r>
+            <a:r>
+              <a:rPr lang="zh-CN" altLang="zh-CN">
+                <a:sym typeface="+mn-ea"/>
+              </a:rPr>
+              <a:t>缩写</a:t>
+            </a:r>
+            <a:endParaRPr lang="zh-CN" altLang="zh-CN">
+              <a:sym typeface="+mn-ea"/>
+            </a:endParaRPr>
+          </a:p>
+          <a:p>
+            <a:r>
+              <a:rPr lang="zh-CN" altLang="en-US"/>
+              <a:t>在绑定 class 或 style 特性时，支持其它类型的值，如数组或对象。</a:t>
+            </a:r>
+            <a:endParaRPr lang="zh-CN" altLang="en-US"/>
+          </a:p>
+        </p:txBody>
+      </p:sp>
+    </p:spTree>
+  </p:cSld>
+  <p:clrMapOvr>
+    <a:masterClrMapping/>
+  </p:clrMapOvr>
+</p:sld>
+</file>
+
+<file path=ppt/slides/slide19.xml><?xml version="1.0" encoding="utf-8"?>
+<p:sld xmlns:a="http://schemas.openxmlformats.org/drawingml/2006/main" xmlns:r="http://schemas.openxmlformats.org/officeDocument/2006/relationships" xmlns:p="http://schemas.openxmlformats.org/presentationml/2006/main">
+  <p:cSld>
+    <p:spTree>
+      <p:nvGrpSpPr>
+        <p:cNvPr id="1" name=""/>
+        <p:cNvGrpSpPr/>
+        <p:nvPr/>
+      </p:nvGrpSpPr>
+      <p:grpSpPr/>
+      <p:sp>
+        <p:nvSpPr>
+          <p:cNvPr id="2" name="标题 1"/>
+          <p:cNvSpPr>
+            <a:spLocks noGrp="1"/>
+          </p:cNvSpPr>
+          <p:nvPr>
+            <p:ph type="title"/>
+          </p:nvPr>
+        </p:nvSpPr>
+        <p:spPr/>
+        <p:txBody>
+          <a:bodyPr/>
+          <a:p>
+            <a:r>
+              <a:rPr lang="en-US" altLang="zh-CN"/>
+              <a:t>v-on</a:t>
+            </a:r>
+            <a:r>
+              <a:rPr lang="zh-CN" altLang="en-US"/>
+              <a:t>指令：</a:t>
+            </a:r>
+            <a:endParaRPr lang="zh-CN" altLang="en-US"/>
+          </a:p>
+        </p:txBody>
+      </p:sp>
+      <p:sp>
+        <p:nvSpPr>
+          <p:cNvPr id="3" name="内容占位符 2"/>
+          <p:cNvSpPr>
+            <a:spLocks noGrp="1"/>
+          </p:cNvSpPr>
+          <p:nvPr>
+            <p:ph idx="1"/>
+          </p:nvPr>
+        </p:nvSpPr>
+        <p:spPr/>
+        <p:txBody>
+          <a:bodyPr/>
+          <a:p>
+            <a:r>
+              <a:rPr lang="zh-CN" altLang="en-US"/>
+              <a:t>v-on指令用于给监听DOM事件，它的用语法和v-bind是类似的，例如监听&lt;a&gt;元素的点击事件：</a:t>
+            </a:r>
+            <a:endParaRPr lang="zh-CN" altLang="en-US"/>
+          </a:p>
+          <a:p>
+            <a:pPr marL="0" indent="0">
+              <a:buNone/>
+            </a:pPr>
+            <a:r>
+              <a:rPr lang="en-US" altLang="zh-CN"/>
+              <a:t>	</a:t>
+            </a:r>
+            <a:r>
+              <a:rPr lang="zh-CN" altLang="en-US"/>
+              <a:t>&lt;a v-on:click="doSomething"&gt;</a:t>
+            </a:r>
+            <a:endParaRPr lang="zh-CN" altLang="en-US"/>
+          </a:p>
+          <a:p>
+            <a:pPr marL="0" indent="0">
+              <a:buNone/>
+            </a:pPr>
+            <a:r>
+              <a:rPr lang="en-US" altLang="zh-CN"/>
+              <a:t>	</a:t>
+            </a:r>
+            <a:r>
+              <a:rPr lang="zh-CN" altLang="en-US">
+                <a:sym typeface="+mn-ea"/>
+              </a:rPr>
+              <a:t>&lt;a </a:t>
+            </a:r>
+            <a:r>
+              <a:rPr lang="en-US" altLang="zh-CN">
+                <a:sym typeface="+mn-ea"/>
+              </a:rPr>
+              <a:t>@</a:t>
+            </a:r>
+            <a:r>
+              <a:rPr lang="zh-CN" altLang="en-US">
+                <a:sym typeface="+mn-ea"/>
+              </a:rPr>
+              <a:t>click="doSomething"&gt;     </a:t>
+            </a:r>
+            <a:r>
+              <a:rPr lang="en-US" altLang="zh-CN">
+                <a:sym typeface="+mn-ea"/>
+              </a:rPr>
+              <a:t>--</a:t>
+            </a:r>
+            <a:r>
+              <a:rPr lang="zh-CN" altLang="zh-CN">
+                <a:sym typeface="+mn-ea"/>
+              </a:rPr>
+              <a:t>缩写</a:t>
+            </a:r>
+            <a:endParaRPr lang="zh-CN" altLang="zh-CN">
+              <a:sym typeface="+mn-ea"/>
+            </a:endParaRPr>
+          </a:p>
+          <a:p>
+            <a:r>
+              <a:rPr lang="zh-CN" altLang="en-US"/>
+              <a:t>有两种形式调用方法：绑定一个方法（让事件指向方法的引用），或者使用内联语句。</a:t>
+            </a:r>
+            <a:endParaRPr lang="zh-CN" altLang="en-US"/>
+          </a:p>
+          <a:p>
+            <a:r>
+              <a:rPr lang="zh-CN" altLang="en-US"/>
+              <a:t>用在普通元素上时，只能监听 原生 DOM 事件。用在自定义元素组件上时，也可以监听子组件触发的自定义事件。</a:t>
+            </a:r>
+            <a:endParaRPr lang="zh-CN" altLang="en-US"/>
           </a:p>
         </p:txBody>
       </p:sp>
@@ -2837,7 +4367,7 @@
             </a:r>
             <a:r>
               <a:rPr lang="zh-CN" altLang="en-US"/>
-              <a:t>的思想构建的。</a:t>
+              <a:t>的思想构建的</a:t>
             </a:r>
             <a:endParaRPr lang="zh-CN" altLang="en-US"/>
           </a:p>
@@ -2846,6 +4376,75 @@
               <a:rPr lang="zh-CN" altLang="en-US"/>
               <a:t>相比于Angular.js，Vue.js提供了更加简洁、更易于理解的API，使得我们能够快速地上手并使用Vue.js</a:t>
             </a:r>
+            <a:endParaRPr lang="zh-CN" altLang="en-US"/>
+          </a:p>
+          <a:p>
+            <a:r>
+              <a:rPr lang="zh-CN" altLang="en-US"/>
+              <a:t>Vue.js 的核心是一个允许采用简洁的模板语法来声明式的将数据渲染进 DOM</a:t>
+            </a:r>
+            <a:endParaRPr lang="zh-CN" altLang="en-US"/>
+          </a:p>
+        </p:txBody>
+      </p:sp>
+    </p:spTree>
+  </p:cSld>
+  <p:clrMapOvr>
+    <a:masterClrMapping/>
+  </p:clrMapOvr>
+</p:sld>
+</file>
+
+<file path=ppt/slides/slide20.xml><?xml version="1.0" encoding="utf-8"?>
+<p:sld xmlns:a="http://schemas.openxmlformats.org/drawingml/2006/main" xmlns:r="http://schemas.openxmlformats.org/officeDocument/2006/relationships" xmlns:p="http://schemas.openxmlformats.org/presentationml/2006/main">
+  <p:cSld>
+    <p:spTree>
+      <p:nvGrpSpPr>
+        <p:cNvPr id="1" name=""/>
+        <p:cNvGrpSpPr/>
+        <p:nvPr/>
+      </p:nvGrpSpPr>
+      <p:grpSpPr/>
+      <p:sp>
+        <p:nvSpPr>
+          <p:cNvPr id="2" name="标题 1"/>
+          <p:cNvSpPr>
+            <a:spLocks noGrp="1"/>
+          </p:cNvSpPr>
+          <p:nvPr>
+            <p:ph type="title"/>
+          </p:nvPr>
+        </p:nvSpPr>
+        <p:spPr/>
+        <p:txBody>
+          <a:bodyPr/>
+          <a:p>
+            <a:r>
+              <a:rPr lang="en-US" altLang="zh-CN"/>
+              <a:t>Vue</a:t>
+            </a:r>
+            <a:r>
+              <a:rPr lang="zh-CN" altLang="zh-CN"/>
+              <a:t>组件</a:t>
+            </a:r>
+            <a:endParaRPr lang="zh-CN" altLang="zh-CN"/>
+          </a:p>
+        </p:txBody>
+      </p:sp>
+      <p:sp>
+        <p:nvSpPr>
+          <p:cNvPr id="3" name="内容占位符 2"/>
+          <p:cNvSpPr>
+            <a:spLocks noGrp="1"/>
+          </p:cNvSpPr>
+          <p:nvPr>
+            <p:ph idx="1"/>
+          </p:nvPr>
+        </p:nvSpPr>
+        <p:spPr/>
+        <p:txBody>
+          <a:bodyPr/>
+          <a:p>
             <a:endParaRPr lang="zh-CN" altLang="en-US"/>
           </a:p>
         </p:txBody>
@@ -2941,7 +4540,11 @@
             </a:endParaRPr>
           </a:p>
           <a:p>
-            <a:pPr lvl="1"/>
+            <a:pPr lvl="1" fontAlgn="auto">
+              <a:lnSpc>
+                <a:spcPct val="100000"/>
+              </a:lnSpc>
+            </a:pPr>
             <a:r>
               <a:rPr lang="zh-CN" altLang="en-US">
                 <a:sym typeface="+mn-ea"/>
@@ -3072,13 +4675,7 @@
               <a:rPr lang="en-US" altLang="zh-CN">
                 <a:sym typeface="+mn-ea"/>
               </a:rPr>
-              <a:t>	</a:t>
-            </a:r>
-            <a:r>
-              <a:rPr lang="en-US" altLang="zh-CN">
-                <a:sym typeface="+mn-ea"/>
-              </a:rPr>
-              <a:t>DOM</a:t>
+              <a:t>	DOM</a:t>
             </a:r>
             <a:r>
               <a:rPr lang="zh-CN" altLang="en-US">
@@ -3394,6 +4991,197 @@
       <p:grpSpPr/>
       <p:sp>
         <p:nvSpPr>
+          <p:cNvPr id="3" name="内容占位符 2"/>
+          <p:cNvSpPr>
+            <a:spLocks noGrp="1"/>
+          </p:cNvSpPr>
+          <p:nvPr>
+            <p:ph idx="1"/>
+          </p:nvPr>
+        </p:nvSpPr>
+        <p:spPr>
+          <a:xfrm>
+            <a:off x="320040" y="294005"/>
+            <a:ext cx="11189970" cy="6409055"/>
+          </a:xfrm>
+        </p:spPr>
+        <p:txBody>
+          <a:bodyPr>
+            <a:normAutofit/>
+          </a:bodyPr>
+          <a:p>
+            <a:pPr marL="0" indent="0">
+              <a:buNone/>
+            </a:pPr>
+            <a:r>
+              <a:rPr lang="zh-CN" altLang="en-US" sz="2400"/>
+              <a:t>构造器：</a:t>
+            </a:r>
+            <a:r>
+              <a:rPr lang="en-US" altLang="zh-CN" sz="2400"/>
+              <a:t>	</a:t>
+            </a:r>
+            <a:r>
+              <a:rPr lang="zh-CN" altLang="en-US" sz="2400"/>
+              <a:t>var vm = new Vue({</a:t>
+            </a:r>
+            <a:endParaRPr lang="zh-CN" altLang="en-US" sz="2400"/>
+          </a:p>
+          <a:p>
+            <a:pPr marL="0" indent="0">
+              <a:buNone/>
+            </a:pPr>
+            <a:r>
+              <a:rPr lang="en-US" altLang="zh-CN" sz="2400"/>
+              <a:t>			</a:t>
+            </a:r>
+            <a:r>
+              <a:rPr lang="zh-CN" altLang="en-US" sz="2400">
+                <a:sym typeface="+mn-ea"/>
+              </a:rPr>
+              <a:t>// 选项</a:t>
+            </a:r>
+            <a:endParaRPr lang="zh-CN" altLang="en-US" sz="2400"/>
+          </a:p>
+          <a:p>
+            <a:pPr marL="0" indent="0">
+              <a:buNone/>
+            </a:pPr>
+            <a:r>
+              <a:rPr lang="en-US" altLang="zh-CN" sz="2400">
+                <a:sym typeface="+mn-ea"/>
+              </a:rPr>
+              <a:t>		</a:t>
+            </a:r>
+            <a:r>
+              <a:rPr lang="zh-CN" altLang="en-US" sz="2400">
+                <a:sym typeface="+mn-ea"/>
+              </a:rPr>
+              <a:t>})</a:t>
+            </a:r>
+            <a:r>
+              <a:rPr lang="en-US" altLang="zh-CN" sz="2400">
+                <a:sym typeface="+mn-ea"/>
+              </a:rPr>
+              <a:t>;</a:t>
+            </a:r>
+            <a:endParaRPr lang="en-US" altLang="zh-CN" sz="2400">
+              <a:sym typeface="+mn-ea"/>
+            </a:endParaRPr>
+          </a:p>
+          <a:p>
+            <a:pPr marL="0" indent="0">
+              <a:buNone/>
+            </a:pPr>
+            <a:r>
+              <a:rPr lang="zh-CN" altLang="en-US" sz="2400"/>
+              <a:t>扩展 Vue 构造器，从而用预定义选项创建可复用的组件构造器：</a:t>
+            </a:r>
+            <a:endParaRPr lang="zh-CN" altLang="en-US" sz="2400"/>
+          </a:p>
+          <a:p>
+            <a:pPr marL="0" indent="0">
+              <a:buNone/>
+            </a:pPr>
+            <a:r>
+              <a:rPr lang="en-US" altLang="zh-CN" sz="2400"/>
+              <a:t>	var MyComponent = Vue.extend({</a:t>
+            </a:r>
+            <a:endParaRPr lang="en-US" altLang="zh-CN" sz="2400"/>
+          </a:p>
+          <a:p>
+            <a:pPr marL="0" indent="0">
+              <a:buNone/>
+            </a:pPr>
+            <a:r>
+              <a:rPr lang="en-US" altLang="zh-CN" sz="2400"/>
+              <a:t>  		// 扩展选项</a:t>
+            </a:r>
+            <a:endParaRPr lang="en-US" altLang="zh-CN" sz="2400"/>
+          </a:p>
+          <a:p>
+            <a:pPr marL="0" indent="0">
+              <a:buNone/>
+            </a:pPr>
+            <a:r>
+              <a:rPr lang="en-US" altLang="zh-CN" sz="2400"/>
+              <a:t>	});</a:t>
+            </a:r>
+            <a:endParaRPr lang="zh-CN" altLang="en-US" sz="2400"/>
+          </a:p>
+          <a:p>
+            <a:pPr marL="0" indent="0">
+              <a:buNone/>
+            </a:pPr>
+            <a:r>
+              <a:rPr lang="en-US" altLang="zh-CN" sz="2400"/>
+              <a:t>	// 所有的 `MyComponent` 实例都将以预定义的扩展选项被创建</a:t>
+            </a:r>
+            <a:endParaRPr lang="en-US" altLang="zh-CN" sz="2400"/>
+          </a:p>
+          <a:p>
+            <a:pPr marL="0" indent="0">
+              <a:buNone/>
+            </a:pPr>
+            <a:r>
+              <a:rPr lang="en-US" altLang="zh-CN" sz="2400"/>
+              <a:t>	var myComponentInstance = new MyComponent();</a:t>
+            </a:r>
+            <a:endParaRPr lang="en-US" altLang="zh-CN" sz="2400"/>
+          </a:p>
+          <a:p>
+            <a:pPr marL="0" indent="0">
+              <a:buNone/>
+            </a:pPr>
+            <a:r>
+              <a:rPr lang="en-US" altLang="zh-CN" sz="2400"/>
+              <a:t>	/*</a:t>
+            </a:r>
+            <a:r>
+              <a:rPr lang="zh-CN" altLang="en-US" sz="2400"/>
+              <a:t>Vue.js 组件其实都是被扩展的 Vue 实例</a:t>
+            </a:r>
+            <a:r>
+              <a:rPr lang="en-US" altLang="zh-CN" sz="2400"/>
+              <a:t>,尽管可以命令式地创建扩展实例，不过在多数情况下建议将组件构造器注册为一个自定义元素，然后声明式地用在模板中*/</a:t>
+            </a:r>
+            <a:endParaRPr lang="en-US" altLang="zh-CN" sz="2400"/>
+          </a:p>
+          <a:p>
+            <a:endParaRPr lang="zh-CN" altLang="en-US" sz="1800"/>
+          </a:p>
+          <a:p>
+            <a:pPr marL="0" indent="0">
+              <a:buNone/>
+            </a:pPr>
+            <a:r>
+              <a:rPr lang="en-US" altLang="zh-CN" sz="1800"/>
+              <a:t>			</a:t>
+            </a:r>
+            <a:endParaRPr lang="zh-CN" altLang="en-US" sz="1800"/>
+          </a:p>
+        </p:txBody>
+      </p:sp>
+    </p:spTree>
+  </p:cSld>
+  <p:clrMapOvr>
+    <a:masterClrMapping/>
+  </p:clrMapOvr>
+</p:sld>
+</file>
+
+<file path=ppt/slides/slide7.xml><?xml version="1.0" encoding="utf-8"?>
+<p:sld xmlns:a="http://schemas.openxmlformats.org/drawingml/2006/main" xmlns:r="http://schemas.openxmlformats.org/officeDocument/2006/relationships" xmlns:p="http://schemas.openxmlformats.org/presentationml/2006/main">
+  <p:cSld>
+    <p:spTree>
+      <p:nvGrpSpPr>
+        <p:cNvPr id="1" name=""/>
+        <p:cNvGrpSpPr/>
+        <p:nvPr/>
+      </p:nvGrpSpPr>
+      <p:grpSpPr/>
+      <p:sp>
+        <p:nvSpPr>
           <p:cNvPr id="2" name="标题 1"/>
           <p:cNvSpPr>
             <a:spLocks noGrp="1"/>
@@ -3407,14 +5195,22 @@
           <a:bodyPr/>
           <a:p>
             <a:r>
+              <a:rPr lang="en-US" altLang="zh-CN">
+                <a:sym typeface="+mn-ea"/>
+              </a:rPr>
+              <a:t>el</a:t>
+            </a:r>
+            <a:r>
+              <a:rPr lang="zh-CN" altLang="en-US">
+                <a:sym typeface="+mn-ea"/>
+              </a:rPr>
+              <a:t>选项</a:t>
+            </a:r>
+            <a:r>
               <a:rPr lang="en-US" altLang="zh-CN"/>
-              <a:t>Vue</a:t>
-            </a:r>
-            <a:r>
-              <a:rPr lang="zh-CN" altLang="en-US"/>
-              <a:t>如何实现双向绑定</a:t>
-            </a:r>
-            <a:endParaRPr lang="zh-CN" altLang="en-US"/>
+              <a:t>:</a:t>
+            </a:r>
+            <a:endParaRPr lang="en-US" altLang="zh-CN"/>
           </a:p>
         </p:txBody>
       </p:sp>
@@ -3431,26 +5227,242 @@
         <p:spPr>
           <a:xfrm>
             <a:off x="838200" y="1825625"/>
-            <a:ext cx="10686415" cy="4351655"/>
+            <a:ext cx="10515600" cy="4573905"/>
           </a:xfrm>
         </p:spPr>
         <p:txBody>
+          <a:bodyPr>
+            <a:normAutofit lnSpcReduction="20000"/>
+          </a:bodyPr>
+          <a:p>
+            <a:r>
+              <a:rPr lang="en-US" altLang="zh-CN"/>
+              <a:t>类型： string | HTMLElement</a:t>
+            </a:r>
+            <a:endParaRPr lang="en-US" altLang="zh-CN"/>
+          </a:p>
+          <a:p>
+            <a:endParaRPr lang="en-US" altLang="zh-CN"/>
+          </a:p>
+          <a:p>
+            <a:r>
+              <a:rPr lang="en-US" altLang="zh-CN"/>
+              <a:t>限制： 只在由 new 创建的实例中遵守。</a:t>
+            </a:r>
+            <a:endParaRPr lang="en-US" altLang="zh-CN"/>
+          </a:p>
+          <a:p>
+            <a:endParaRPr lang="en-US" altLang="zh-CN"/>
+          </a:p>
+          <a:p>
+            <a:pPr fontAlgn="auto">
+              <a:lnSpc>
+                <a:spcPct val="100000"/>
+              </a:lnSpc>
+            </a:pPr>
+            <a:r>
+              <a:rPr lang="en-US" altLang="zh-CN"/>
+              <a:t>详细：提供一个在页面上已存在的 DOM 元素作为 Vue 实例的挂载目标。可以是 CSS 选择器，也可以是一个 HTMLElement 实例。</a:t>
+            </a:r>
+            <a:endParaRPr lang="en-US" altLang="zh-CN"/>
+          </a:p>
+          <a:p>
+            <a:endParaRPr lang="en-US" altLang="zh-CN"/>
+          </a:p>
+          <a:p>
+            <a:r>
+              <a:rPr lang="en-US" altLang="zh-CN"/>
+              <a:t>在实例挂载之后， 元素可以用 vm.$el 访问。</a:t>
+            </a:r>
+            <a:endParaRPr lang="en-US" altLang="zh-CN"/>
+          </a:p>
+        </p:txBody>
+      </p:sp>
+    </p:spTree>
+  </p:cSld>
+  <p:clrMapOvr>
+    <a:masterClrMapping/>
+  </p:clrMapOvr>
+</p:sld>
+</file>
+
+<file path=ppt/slides/slide8.xml><?xml version="1.0" encoding="utf-8"?>
+<p:sld xmlns:a="http://schemas.openxmlformats.org/drawingml/2006/main" xmlns:r="http://schemas.openxmlformats.org/officeDocument/2006/relationships" xmlns:p="http://schemas.openxmlformats.org/presentationml/2006/main">
+  <p:cSld>
+    <p:spTree>
+      <p:nvGrpSpPr>
+        <p:cNvPr id="1" name=""/>
+        <p:cNvGrpSpPr/>
+        <p:nvPr/>
+      </p:nvGrpSpPr>
+      <p:grpSpPr/>
+      <p:sp>
+        <p:nvSpPr>
+          <p:cNvPr id="2" name="标题 1"/>
+          <p:cNvSpPr>
+            <a:spLocks noGrp="1"/>
+          </p:cNvSpPr>
+          <p:nvPr>
+            <p:ph type="title"/>
+          </p:nvPr>
+        </p:nvSpPr>
+        <p:spPr/>
+        <p:txBody>
+          <a:bodyPr>
+            <a:normAutofit/>
+          </a:bodyPr>
+          <a:p>
+            <a:r>
+              <a:rPr lang="en-US" altLang="zh-CN">
+                <a:sym typeface="+mn-ea"/>
+              </a:rPr>
+              <a:t>data</a:t>
+            </a:r>
+            <a:r>
+              <a:rPr lang="zh-CN" altLang="en-US">
+                <a:sym typeface="+mn-ea"/>
+              </a:rPr>
+              <a:t>选项</a:t>
+            </a:r>
+            <a:r>
+              <a:rPr lang="en-US" altLang="zh-CN">
+                <a:sym typeface="+mn-ea"/>
+              </a:rPr>
+              <a:t>:</a:t>
+            </a:r>
+            <a:endParaRPr lang="zh-CN" altLang="en-US"/>
+          </a:p>
+        </p:txBody>
+      </p:sp>
+      <p:sp>
+        <p:nvSpPr>
+          <p:cNvPr id="3" name="内容占位符 2"/>
+          <p:cNvSpPr>
+            <a:spLocks noGrp="1"/>
+          </p:cNvSpPr>
+          <p:nvPr>
+            <p:ph idx="1"/>
+          </p:nvPr>
+        </p:nvSpPr>
+        <p:spPr/>
+        <p:txBody>
           <a:bodyPr/>
           <a:p>
             <a:r>
               <a:rPr lang="zh-CN" altLang="en-US"/>
-              <a:t>MVVM模式本身是实现了双向绑定的，在Vue.js中可以使用v-model指令在表单元素上创建双向数据绑定。</a:t>
-            </a:r>
-            <a:endParaRPr lang="zh-CN" altLang="en-US"/>
-          </a:p>
-          <a:p>
+              <a:t>类型： Object | Function</a:t>
+            </a:r>
+            <a:endParaRPr lang="zh-CN" altLang="en-US"/>
+          </a:p>
+          <a:p>
+            <a:endParaRPr lang="zh-CN" altLang="en-US"/>
+          </a:p>
+          <a:p>
+            <a:r>
+              <a:rPr lang="zh-CN" altLang="en-US"/>
+              <a:t>限制: 组件的定义只接受 function。</a:t>
+            </a:r>
+            <a:endParaRPr lang="zh-CN" altLang="en-US"/>
+          </a:p>
+          <a:p>
+            <a:endParaRPr lang="zh-CN" altLang="en-US"/>
+          </a:p>
+          <a:p>
+            <a:r>
+              <a:rPr lang="zh-CN" altLang="en-US"/>
+              <a:t>详细:Vue 实例的数据对象</a:t>
+            </a:r>
             <a:r>
               <a:rPr lang="en-US" altLang="zh-CN"/>
-              <a:t>Vue</a:t>
+              <a:t>,对象必须是纯粹的对象(含有零个或多个的key/value对)</a:t>
             </a:r>
             <a:r>
               <a:rPr lang="zh-CN" altLang="en-US"/>
-              <a:t>双向绑定示例。</a:t>
+              <a:t>。</a:t>
+            </a:r>
+            <a:r>
+              <a:rPr lang="en-US" altLang="zh-CN"/>
+              <a:t>实例创建之后，可以通过 vm.$data 访问原始数据对象。Vue 实例也代理了 data 对象上所有的属性，因此访问 vm.a 等价于访问 vm.$data.a</a:t>
+            </a:r>
+            <a:r>
+              <a:rPr lang="zh-CN" altLang="zh-CN"/>
+              <a:t>、</a:t>
+            </a:r>
+            <a:endParaRPr lang="zh-CN" altLang="zh-CN"/>
+          </a:p>
+        </p:txBody>
+      </p:sp>
+    </p:spTree>
+  </p:cSld>
+  <p:clrMapOvr>
+    <a:masterClrMapping/>
+  </p:clrMapOvr>
+</p:sld>
+</file>
+
+<file path=ppt/slides/slide9.xml><?xml version="1.0" encoding="utf-8"?>
+<p:sld xmlns:a="http://schemas.openxmlformats.org/drawingml/2006/main" xmlns:r="http://schemas.openxmlformats.org/officeDocument/2006/relationships" xmlns:p="http://schemas.openxmlformats.org/presentationml/2006/main">
+  <p:cSld>
+    <p:spTree>
+      <p:nvGrpSpPr>
+        <p:cNvPr id="1" name=""/>
+        <p:cNvGrpSpPr/>
+        <p:nvPr/>
+      </p:nvGrpSpPr>
+      <p:grpSpPr/>
+      <p:sp>
+        <p:nvSpPr>
+          <p:cNvPr id="2" name="标题 1"/>
+          <p:cNvSpPr>
+            <a:spLocks noGrp="1"/>
+          </p:cNvSpPr>
+          <p:nvPr>
+            <p:ph type="title"/>
+          </p:nvPr>
+        </p:nvSpPr>
+        <p:spPr/>
+        <p:txBody>
+          <a:bodyPr/>
+          <a:p>
+            <a:r>
+              <a:rPr lang="en-US" altLang="zh-CN"/>
+              <a:t>methods</a:t>
+            </a:r>
+            <a:r>
+              <a:rPr lang="zh-CN" altLang="en-US"/>
+              <a:t>选项：</a:t>
+            </a:r>
+            <a:endParaRPr lang="zh-CN" altLang="en-US"/>
+          </a:p>
+        </p:txBody>
+      </p:sp>
+      <p:sp>
+        <p:nvSpPr>
+          <p:cNvPr id="3" name="内容占位符 2"/>
+          <p:cNvSpPr>
+            <a:spLocks noGrp="1"/>
+          </p:cNvSpPr>
+          <p:nvPr>
+            <p:ph idx="1"/>
+          </p:nvPr>
+        </p:nvSpPr>
+        <p:spPr/>
+        <p:txBody>
+          <a:bodyPr/>
+          <a:p>
+            <a:r>
+              <a:rPr lang="zh-CN" altLang="en-US"/>
+              <a:t>类型: { [key: string]: Function }</a:t>
+            </a:r>
+            <a:endParaRPr lang="zh-CN" altLang="en-US"/>
+          </a:p>
+          <a:p>
+            <a:endParaRPr lang="zh-CN" altLang="en-US"/>
+          </a:p>
+          <a:p>
+            <a:r>
+              <a:rPr lang="zh-CN" altLang="en-US"/>
+              <a:t>详细:methods 将被混入到 Vue 实例中。可以直接通过 VM 实例访问这些方法，或者在指令表达式中使用。方法中的 this 自动绑定为 Vue 实例。</a:t>
             </a:r>
             <a:endParaRPr lang="zh-CN" altLang="en-US"/>
           </a:p>

</xml_diff>

<commit_message>
2017-4-7 17:40 update study_Vue
</commit_message>
<xml_diff>
--- a/study_Vue/学习Vue.pptx
+++ b/study_Vue/学习Vue.pptx
@@ -15,16 +15,20 @@
     <p:sldId id="272" r:id="rId10"/>
     <p:sldId id="273" r:id="rId11"/>
     <p:sldId id="261" r:id="rId12"/>
-    <p:sldId id="262" r:id="rId13"/>
-    <p:sldId id="263" r:id="rId14"/>
-    <p:sldId id="264" r:id="rId15"/>
-    <p:sldId id="267" r:id="rId16"/>
-    <p:sldId id="266" r:id="rId17"/>
-    <p:sldId id="265" r:id="rId18"/>
-    <p:sldId id="268" r:id="rId19"/>
-    <p:sldId id="269" r:id="rId20"/>
-    <p:sldId id="274" r:id="rId21"/>
-    <p:sldId id="275" r:id="rId22"/>
+    <p:sldId id="285" r:id="rId13"/>
+    <p:sldId id="262" r:id="rId14"/>
+    <p:sldId id="263" r:id="rId15"/>
+    <p:sldId id="264" r:id="rId16"/>
+    <p:sldId id="267" r:id="rId17"/>
+    <p:sldId id="266" r:id="rId18"/>
+    <p:sldId id="265" r:id="rId19"/>
+    <p:sldId id="268" r:id="rId20"/>
+    <p:sldId id="269" r:id="rId21"/>
+    <p:sldId id="274" r:id="rId22"/>
+    <p:sldId id="275" r:id="rId23"/>
+    <p:sldId id="286" r:id="rId24"/>
+    <p:sldId id="287" r:id="rId25"/>
+    <p:sldId id="288" r:id="rId26"/>
   </p:sldIdLst>
   <p:sldSz cx="12192000" cy="6858000"/>
   <p:notesSz cx="7103745" cy="10234295"/>
@@ -2865,23 +2869,10 @@
           <a:bodyPr/>
           <a:p>
             <a:r>
-              <a:rPr lang="en-US" altLang="zh-CN">
-                <a:latin typeface="楷体" panose="02010609060101010101" charset="-122"/>
-                <a:ea typeface="楷体" panose="02010609060101010101" charset="-122"/>
-              </a:rPr>
-              <a:t>Vue</a:t>
-            </a:r>
-            <a:r>
-              <a:rPr lang="zh-CN" altLang="en-US">
-                <a:latin typeface="楷体" panose="02010609060101010101" charset="-122"/>
-                <a:ea typeface="楷体" panose="02010609060101010101" charset="-122"/>
-              </a:rPr>
-              <a:t>指令</a:t>
-            </a:r>
-            <a:endParaRPr lang="zh-CN" altLang="en-US">
-              <a:latin typeface="楷体" panose="02010609060101010101" charset="-122"/>
-              <a:ea typeface="楷体" panose="02010609060101010101" charset="-122"/>
-            </a:endParaRPr>
+              <a:rPr lang="en-US" altLang="zh-CN"/>
+              <a:t>v-model:</a:t>
+            </a:r>
+            <a:endParaRPr lang="en-US" altLang="zh-CN"/>
           </a:p>
         </p:txBody>
       </p:sp>
@@ -2897,68 +2888,68 @@
         </p:nvSpPr>
         <p:spPr/>
         <p:txBody>
-          <a:bodyPr/>
-          <a:p>
-            <a:r>
-              <a:rPr lang="zh-CN" altLang="en-US"/>
-              <a:t>v-model是Vue.js常用的一个指令。</a:t>
-            </a:r>
-            <a:endParaRPr lang="zh-CN" altLang="en-US"/>
-          </a:p>
-          <a:p>
-            <a:r>
-              <a:rPr lang="zh-CN" altLang="en-US"/>
-              <a:t>Vue.js指令：</a:t>
-            </a:r>
-            <a:endParaRPr lang="zh-CN" altLang="en-US"/>
-          </a:p>
-          <a:p>
-            <a:pPr marL="0" indent="0">
-              <a:buNone/>
-            </a:pPr>
-            <a:r>
-              <a:rPr lang="zh-CN" altLang="en-US"/>
-              <a:t>	以v-开头的，它们作用于HTML元素，指令提供了一些特殊的特性，将指令绑定在元素上时，指令会为绑定的目标元素添加一些特殊的行为，我们可以将指令看作特殊的HTML特性（attribute）。</a:t>
-            </a:r>
-            <a:endParaRPr lang="zh-CN" altLang="en-US"/>
-          </a:p>
-          <a:p>
-            <a:pPr marL="0" indent="0">
-              <a:buNone/>
-            </a:pPr>
-            <a:r>
-              <a:rPr lang="en-US" altLang="zh-CN"/>
-              <a:t>	Vue.js</a:t>
-            </a:r>
-            <a:r>
-              <a:rPr lang="zh-CN" altLang="zh-CN"/>
-              <a:t>指令内可以直接通过</a:t>
-            </a:r>
-            <a:r>
-              <a:rPr lang="en-US" altLang="zh-CN"/>
-              <a:t>key</a:t>
-            </a:r>
-            <a:r>
-              <a:rPr lang="zh-CN" altLang="zh-CN"/>
-              <a:t>调用</a:t>
-            </a:r>
-            <a:r>
-              <a:rPr lang="en-US" altLang="zh-CN"/>
-              <a:t>Vue</a:t>
-            </a:r>
-            <a:r>
-              <a:rPr lang="zh-CN" altLang="en-US"/>
-              <a:t>实例内的</a:t>
-            </a:r>
-            <a:r>
-              <a:rPr lang="en-US" altLang="zh-CN"/>
-              <a:t>data</a:t>
-            </a:r>
-            <a:r>
-              <a:rPr lang="zh-CN" altLang="en-US"/>
-              <a:t>数据。</a:t>
-            </a:r>
-            <a:endParaRPr lang="en-US" altLang="zh-CN"/>
+          <a:bodyPr>
+            <a:normAutofit/>
+          </a:bodyPr>
+          <a:p>
+            <a:r>
+              <a:rPr lang="zh-CN" altLang="en-US"/>
+              <a:t>类型： 随表单控件类型不同而不同。</a:t>
+            </a:r>
+            <a:endParaRPr lang="zh-CN" altLang="en-US"/>
+          </a:p>
+          <a:p>
+            <a:r>
+              <a:rPr lang="zh-CN" altLang="en-US"/>
+              <a:t>限制：&lt;input&gt;&lt;select&gt;&lt;textarea&gt;components</a:t>
+            </a:r>
+            <a:endParaRPr lang="zh-CN" altLang="en-US"/>
+          </a:p>
+          <a:p>
+            <a:r>
+              <a:rPr lang="zh-CN" altLang="en-US"/>
+              <a:t>用法：</a:t>
+            </a:r>
+            <a:endParaRPr lang="zh-CN" altLang="en-US"/>
+          </a:p>
+          <a:p>
+            <a:pPr lvl="1"/>
+            <a:r>
+              <a:rPr lang="zh-CN" altLang="en-US"/>
+              <a:t>在表单控件或者组件上创建双向绑定。</a:t>
+            </a:r>
+            <a:endParaRPr lang="zh-CN" altLang="en-US"/>
+          </a:p>
+          <a:p>
+            <a:r>
+              <a:rPr lang="zh-CN" altLang="en-US"/>
+              <a:t>修饰符：</a:t>
+            </a:r>
+            <a:endParaRPr lang="zh-CN" altLang="en-US"/>
+          </a:p>
+          <a:p>
+            <a:pPr lvl="1"/>
+            <a:r>
+              <a:rPr lang="zh-CN" altLang="en-US"/>
+              <a:t>.lazy - 取代 input 监听 change 事件</a:t>
+            </a:r>
+            <a:endParaRPr lang="zh-CN" altLang="en-US"/>
+          </a:p>
+          <a:p>
+            <a:pPr lvl="1"/>
+            <a:r>
+              <a:rPr lang="zh-CN" altLang="en-US"/>
+              <a:t>.number - 输入字符串转为数字</a:t>
+            </a:r>
+            <a:endParaRPr lang="zh-CN" altLang="en-US"/>
+          </a:p>
+          <a:p>
+            <a:pPr lvl="1"/>
+            <a:r>
+              <a:rPr lang="zh-CN" altLang="en-US"/>
+              <a:t>.trim - 输入首尾空格过滤</a:t>
+            </a:r>
+            <a:endParaRPr lang="zh-CN" altLang="en-US"/>
           </a:p>
         </p:txBody>
       </p:sp>
@@ -2995,13 +2986,6 @@
           <a:bodyPr/>
           <a:p>
             <a:r>
-              <a:rPr lang="zh-CN" altLang="en-US">
-                <a:latin typeface="楷体" panose="02010609060101010101" charset="-122"/>
-                <a:ea typeface="楷体" panose="02010609060101010101" charset="-122"/>
-              </a:rPr>
-              <a:t>常用</a:t>
-            </a:r>
-            <a:r>
               <a:rPr lang="en-US" altLang="zh-CN">
                 <a:latin typeface="楷体" panose="02010609060101010101" charset="-122"/>
                 <a:ea typeface="楷体" panose="02010609060101010101" charset="-122"/>
@@ -3032,272 +3016,70 @@
             <p:ph idx="1"/>
           </p:nvPr>
         </p:nvSpPr>
-        <p:spPr>
-          <a:xfrm>
-            <a:off x="838200" y="1825625"/>
-            <a:ext cx="10786745" cy="4351655"/>
-          </a:xfrm>
-        </p:spPr>
-        <p:txBody>
-          <a:bodyPr/>
-          <a:p>
-            <a:r>
-              <a:rPr lang="en-US" altLang="en-US"/>
-              <a:t>v-if		</a:t>
-            </a:r>
-            <a:r>
-              <a:rPr lang="en-US" altLang="en-US" sz="2400">
-                <a:latin typeface="宋体" panose="02010600030101010101" pitchFamily="2" charset="-122"/>
-                <a:ea typeface="宋体" panose="02010600030101010101" pitchFamily="2" charset="-122"/>
-              </a:rPr>
-              <a:t>条件渲染指令，它根据表达式的真假来删除和插入元素</a:t>
-            </a:r>
-            <a:endParaRPr lang="zh-CN" altLang="en-US" sz="2400">
-              <a:latin typeface="宋体" panose="02010600030101010101" pitchFamily="2" charset="-122"/>
-              <a:ea typeface="宋体" panose="02010600030101010101" pitchFamily="2" charset="-122"/>
-            </a:endParaRPr>
-          </a:p>
-          <a:p>
-            <a:r>
-              <a:rPr lang="en-US" altLang="en-US" sz="2800">
-                <a:sym typeface="+mn-ea"/>
-              </a:rPr>
-              <a:t>v-else-if</a:t>
-            </a:r>
-            <a:r>
-              <a:rPr lang="en-US" altLang="en-US" sz="2400">
-                <a:latin typeface="宋体" panose="02010600030101010101" pitchFamily="2" charset="-122"/>
-                <a:ea typeface="宋体" panose="02010600030101010101" pitchFamily="2" charset="-122"/>
-                <a:sym typeface="+mn-ea"/>
-              </a:rPr>
-              <a:t>	</a:t>
-            </a:r>
-            <a:r>
-              <a:rPr lang="en-US" altLang="en-US" sz="2400">
-                <a:latin typeface="宋体" panose="02010600030101010101" pitchFamily="2" charset="-122"/>
-                <a:ea typeface="宋体" panose="02010600030101010101" pitchFamily="2" charset="-122"/>
-                <a:sym typeface="+mn-ea"/>
-              </a:rPr>
-              <a:t>为</a:t>
-            </a:r>
-            <a:r>
-              <a:rPr lang="en-US" altLang="en-US" sz="2800">
-                <a:sym typeface="+mn-ea"/>
-              </a:rPr>
-              <a:t>v-if</a:t>
-            </a:r>
-            <a:r>
-              <a:rPr lang="en-US" altLang="en-US" sz="2400">
-                <a:latin typeface="宋体" panose="02010600030101010101" pitchFamily="2" charset="-122"/>
-                <a:ea typeface="宋体" panose="02010600030101010101" pitchFamily="2" charset="-122"/>
-                <a:sym typeface="+mn-ea"/>
-              </a:rPr>
-              <a:t>添加一个“</a:t>
-            </a:r>
-            <a:r>
-              <a:rPr lang="en-US" altLang="en-US" sz="2800">
-                <a:sym typeface="+mn-ea"/>
-              </a:rPr>
-              <a:t>else if</a:t>
-            </a:r>
-            <a:r>
-              <a:rPr lang="en-US" altLang="en-US" sz="2400">
-                <a:latin typeface="宋体" panose="02010600030101010101" pitchFamily="2" charset="-122"/>
-                <a:ea typeface="宋体" panose="02010600030101010101" pitchFamily="2" charset="-122"/>
-                <a:sym typeface="+mn-ea"/>
-              </a:rPr>
-              <a:t>块”</a:t>
-            </a:r>
-            <a:endParaRPr lang="en-US" altLang="en-US" sz="2400">
-              <a:latin typeface="宋体" panose="02010600030101010101" pitchFamily="2" charset="-122"/>
-              <a:ea typeface="宋体" panose="02010600030101010101" pitchFamily="2" charset="-122"/>
-              <a:sym typeface="+mn-ea"/>
-            </a:endParaRPr>
-          </a:p>
-          <a:p>
-            <a:r>
-              <a:rPr lang="en-US" altLang="en-US"/>
-              <a:t>v-else	</a:t>
-            </a:r>
-            <a:r>
-              <a:rPr lang="en-US" altLang="en-US" sz="2400">
-                <a:latin typeface="宋体" panose="02010600030101010101" pitchFamily="2" charset="-122"/>
-                <a:ea typeface="宋体" panose="02010600030101010101" pitchFamily="2" charset="-122"/>
-              </a:rPr>
-              <a:t>为</a:t>
-            </a:r>
-            <a:r>
-              <a:rPr lang="en-US" altLang="en-US" sz="2800"/>
-              <a:t>v-if</a:t>
-            </a:r>
-            <a:r>
-              <a:rPr lang="en-US" altLang="en-US" sz="2400">
-                <a:latin typeface="宋体" panose="02010600030101010101" pitchFamily="2" charset="-122"/>
-                <a:ea typeface="宋体" panose="02010600030101010101" pitchFamily="2" charset="-122"/>
-              </a:rPr>
-              <a:t>或</a:t>
-            </a:r>
-            <a:r>
-              <a:rPr lang="en-US" altLang="en-US" sz="2800"/>
-              <a:t>v-else-if</a:t>
-            </a:r>
-            <a:r>
-              <a:rPr lang="en-US" altLang="en-US" sz="2400">
-                <a:latin typeface="宋体" panose="02010600030101010101" pitchFamily="2" charset="-122"/>
-                <a:ea typeface="宋体" panose="02010600030101010101" pitchFamily="2" charset="-122"/>
-              </a:rPr>
-              <a:t>添加一个“</a:t>
-            </a:r>
-            <a:r>
-              <a:rPr lang="en-US" altLang="en-US" sz="2800"/>
-              <a:t>else</a:t>
-            </a:r>
-            <a:r>
-              <a:rPr lang="en-US" altLang="en-US" sz="2400">
-                <a:latin typeface="宋体" panose="02010600030101010101" pitchFamily="2" charset="-122"/>
-                <a:ea typeface="宋体" panose="02010600030101010101" pitchFamily="2" charset="-122"/>
-              </a:rPr>
-              <a:t>块”</a:t>
-            </a:r>
-            <a:endParaRPr lang="en-US" altLang="en-US" sz="2400">
-              <a:latin typeface="宋体" panose="02010600030101010101" pitchFamily="2" charset="-122"/>
-              <a:ea typeface="宋体" panose="02010600030101010101" pitchFamily="2" charset="-122"/>
-            </a:endParaRPr>
-          </a:p>
-          <a:p>
-            <a:r>
-              <a:rPr lang="en-US" altLang="en-US">
-                <a:sym typeface="+mn-ea"/>
-              </a:rPr>
-              <a:t>v-show	</a:t>
-            </a:r>
-            <a:r>
-              <a:rPr lang="en-US" altLang="en-US" sz="2400">
-                <a:latin typeface="宋体" panose="02010600030101010101" pitchFamily="2" charset="-122"/>
-                <a:ea typeface="宋体" panose="02010600030101010101" pitchFamily="2" charset="-122"/>
-                <a:sym typeface="+mn-ea"/>
-              </a:rPr>
-              <a:t>条件渲染指令，</a:t>
-            </a:r>
-            <a:r>
-              <a:rPr lang="en-US" altLang="en-US" sz="2400">
-                <a:latin typeface="宋体" panose="02010600030101010101" pitchFamily="2" charset="-122"/>
-                <a:ea typeface="宋体" panose="02010600030101010101" pitchFamily="2" charset="-122"/>
-                <a:sym typeface="+mn-ea"/>
-              </a:rPr>
-              <a:t>它根据表达式的真假为元素设置CSS的</a:t>
-            </a:r>
-            <a:r>
-              <a:rPr lang="en-US" altLang="en-US" sz="2800">
-                <a:sym typeface="+mn-ea"/>
-              </a:rPr>
-              <a:t>style</a:t>
-            </a:r>
-            <a:r>
-              <a:rPr lang="en-US" altLang="en-US" sz="2400">
-                <a:latin typeface="宋体" panose="02010600030101010101" pitchFamily="2" charset="-122"/>
-                <a:ea typeface="宋体" panose="02010600030101010101" pitchFamily="2" charset="-122"/>
-                <a:sym typeface="+mn-ea"/>
-              </a:rPr>
-              <a:t>属性</a:t>
-            </a:r>
-            <a:endParaRPr lang="zh-CN" altLang="en-US"/>
-          </a:p>
-          <a:p>
-            <a:r>
-              <a:rPr lang="en-US" altLang="en-US"/>
-              <a:t>v-for		</a:t>
-            </a:r>
-            <a:r>
-              <a:rPr lang="en-US" altLang="en-US" sz="2400">
-                <a:latin typeface="宋体" panose="02010600030101010101" pitchFamily="2" charset="-122"/>
-                <a:ea typeface="宋体" panose="02010600030101010101" pitchFamily="2" charset="-122"/>
-              </a:rPr>
-              <a:t>基于一个数组渲染一个列表</a:t>
-            </a:r>
-            <a:r>
-              <a:rPr lang="zh-CN" altLang="en-US" sz="2400">
-                <a:latin typeface="宋体" panose="02010600030101010101" pitchFamily="2" charset="-122"/>
-                <a:ea typeface="宋体" panose="02010600030101010101" pitchFamily="2" charset="-122"/>
-              </a:rPr>
-              <a:t>，类似</a:t>
-            </a:r>
-            <a:r>
-              <a:rPr lang="en-US" altLang="en-US" sz="2800"/>
-              <a:t>JavaScript</a:t>
-            </a:r>
-            <a:r>
-              <a:rPr lang="en-US" altLang="en-US" sz="2400">
-                <a:latin typeface="宋体" panose="02010600030101010101" pitchFamily="2" charset="-122"/>
-                <a:ea typeface="宋体" panose="02010600030101010101" pitchFamily="2" charset="-122"/>
-              </a:rPr>
-              <a:t>的遍历语法</a:t>
-            </a:r>
-            <a:endParaRPr lang="en-US" altLang="en-US" sz="2400">
-              <a:latin typeface="宋体" panose="02010600030101010101" pitchFamily="2" charset="-122"/>
-              <a:ea typeface="宋体" panose="02010600030101010101" pitchFamily="2" charset="-122"/>
-            </a:endParaRPr>
-          </a:p>
-          <a:p>
-            <a:r>
-              <a:rPr lang="en-US" altLang="en-US"/>
-              <a:t>v-bind	</a:t>
-            </a:r>
-            <a:r>
-              <a:rPr lang="en-US" altLang="en-US" sz="2400">
-                <a:latin typeface="宋体" panose="02010600030101010101" pitchFamily="2" charset="-122"/>
-                <a:ea typeface="宋体" panose="02010600030101010101" pitchFamily="2" charset="-122"/>
-              </a:rPr>
-              <a:t>通常设置</a:t>
-            </a:r>
-            <a:r>
-              <a:rPr lang="en-US" altLang="en-US" sz="2800"/>
-              <a:t>HTML</a:t>
-            </a:r>
-            <a:r>
-              <a:rPr lang="en-US" altLang="en-US" sz="2400">
-                <a:latin typeface="宋体" panose="02010600030101010101" pitchFamily="2" charset="-122"/>
-                <a:ea typeface="宋体" panose="02010600030101010101" pitchFamily="2" charset="-122"/>
-              </a:rPr>
-              <a:t>元素的特性（</a:t>
-            </a:r>
-            <a:r>
-              <a:rPr lang="en-US" altLang="en-US" sz="2800"/>
-              <a:t>attribute</a:t>
-            </a:r>
-            <a:r>
-              <a:rPr lang="en-US" altLang="en-US" sz="2400">
-                <a:latin typeface="宋体" panose="02010600030101010101" pitchFamily="2" charset="-122"/>
-                <a:ea typeface="宋体" panose="02010600030101010101" pitchFamily="2" charset="-122"/>
-              </a:rPr>
-              <a:t>）</a:t>
-            </a:r>
-            <a:endParaRPr lang="zh-CN" altLang="en-US"/>
-          </a:p>
-          <a:p>
-            <a:r>
-              <a:rPr lang="en-US" altLang="en-US"/>
-              <a:t>v-on		</a:t>
-            </a:r>
-            <a:r>
-              <a:rPr lang="en-US" altLang="en-US" sz="2400">
-                <a:latin typeface="宋体" panose="02010600030101010101" pitchFamily="2" charset="-122"/>
-                <a:ea typeface="宋体" panose="02010600030101010101" pitchFamily="2" charset="-122"/>
-              </a:rPr>
-              <a:t>监听</a:t>
-            </a:r>
-            <a:r>
-              <a:rPr lang="en-US" altLang="en-US" sz="2800"/>
-              <a:t>DOM</a:t>
-            </a:r>
-            <a:r>
-              <a:rPr lang="en-US" altLang="en-US" sz="2400">
-                <a:latin typeface="宋体" panose="02010600030101010101" pitchFamily="2" charset="-122"/>
-                <a:ea typeface="宋体" panose="02010600030101010101" pitchFamily="2" charset="-122"/>
-              </a:rPr>
-              <a:t>事件</a:t>
-            </a:r>
-            <a:endParaRPr lang="en-US" altLang="en-US"/>
+        <p:spPr/>
+        <p:txBody>
+          <a:bodyPr/>
+          <a:p>
+            <a:r>
+              <a:rPr lang="zh-CN" altLang="en-US"/>
+              <a:t>v-model是Vue.js常用的一个指令。</a:t>
+            </a:r>
+            <a:endParaRPr lang="zh-CN" altLang="en-US"/>
+          </a:p>
+          <a:p>
+            <a:r>
+              <a:rPr lang="zh-CN" altLang="en-US"/>
+              <a:t>Vue.js指令：</a:t>
+            </a:r>
+            <a:endParaRPr lang="zh-CN" altLang="en-US"/>
+          </a:p>
+          <a:p>
+            <a:pPr marL="0" indent="0">
+              <a:buNone/>
+            </a:pPr>
+            <a:r>
+              <a:rPr lang="zh-CN" altLang="en-US"/>
+              <a:t>	以v-开头的，它们作用于HTML元素，指令提供了一些特殊的特性，将指令绑定在元素上时，指令会为绑定的目标元素添加一些特殊的行为，我们可以将指令看作特殊的HTML特性（attribute）。</a:t>
+            </a:r>
+            <a:endParaRPr lang="zh-CN" altLang="en-US"/>
+          </a:p>
+          <a:p>
+            <a:pPr marL="0" indent="0">
+              <a:buNone/>
+            </a:pPr>
+            <a:r>
+              <a:rPr lang="en-US" altLang="zh-CN"/>
+              <a:t>	Vue.js</a:t>
+            </a:r>
+            <a:r>
+              <a:rPr lang="zh-CN" altLang="zh-CN"/>
+              <a:t>指令内可以直接通过</a:t>
+            </a:r>
+            <a:r>
+              <a:rPr lang="en-US" altLang="zh-CN"/>
+              <a:t>key</a:t>
+            </a:r>
+            <a:r>
+              <a:rPr lang="zh-CN" altLang="zh-CN"/>
+              <a:t>调用</a:t>
+            </a:r>
+            <a:r>
+              <a:rPr lang="en-US" altLang="zh-CN"/>
+              <a:t>Vue</a:t>
+            </a:r>
+            <a:r>
+              <a:rPr lang="zh-CN" altLang="en-US"/>
+              <a:t>实例内的</a:t>
+            </a:r>
+            <a:r>
+              <a:rPr lang="en-US" altLang="zh-CN"/>
+              <a:t>data</a:t>
+            </a:r>
+            <a:r>
+              <a:rPr lang="zh-CN" altLang="en-US"/>
+              <a:t>数据。</a:t>
+            </a:r>
+            <a:endParaRPr lang="en-US" altLang="zh-CN"/>
           </a:p>
         </p:txBody>
       </p:sp>
@@ -3334,18 +3116,25 @@
           <a:bodyPr/>
           <a:p>
             <a:r>
+              <a:rPr lang="zh-CN" altLang="en-US">
+                <a:latin typeface="楷体" panose="02010609060101010101" charset="-122"/>
+                <a:ea typeface="楷体" panose="02010609060101010101" charset="-122"/>
+              </a:rPr>
+              <a:t>常用</a:t>
+            </a:r>
+            <a:r>
               <a:rPr lang="en-US" altLang="zh-CN">
                 <a:latin typeface="楷体" panose="02010609060101010101" charset="-122"/>
                 <a:ea typeface="楷体" panose="02010609060101010101" charset="-122"/>
               </a:rPr>
-              <a:t>v-if</a:t>
+              <a:t>Vue</a:t>
             </a:r>
             <a:r>
               <a:rPr lang="zh-CN" altLang="en-US">
                 <a:latin typeface="楷体" panose="02010609060101010101" charset="-122"/>
                 <a:ea typeface="楷体" panose="02010609060101010101" charset="-122"/>
               </a:rPr>
-              <a:t>指令：</a:t>
+              <a:t>指令</a:t>
             </a:r>
             <a:endParaRPr lang="zh-CN" altLang="en-US">
               <a:latin typeface="楷体" panose="02010609060101010101" charset="-122"/>
@@ -3366,208 +3155,254 @@
         </p:nvSpPr>
         <p:spPr>
           <a:xfrm>
-            <a:off x="772160" y="1691640"/>
-            <a:ext cx="10515600" cy="4543425"/>
+            <a:off x="838200" y="1825625"/>
+            <a:ext cx="10786745" cy="4351655"/>
           </a:xfrm>
         </p:spPr>
         <p:txBody>
-          <a:bodyPr>
-            <a:normAutofit lnSpcReduction="20000"/>
-          </a:bodyPr>
-          <a:p>
-            <a:pPr marL="0" indent="0" fontAlgn="auto">
-              <a:lnSpc>
-                <a:spcPct val="100000"/>
-              </a:lnSpc>
-              <a:buNone/>
-            </a:pPr>
-            <a:r>
-              <a:rPr lang="en-US" altLang="zh-CN"/>
-              <a:t>	</a:t>
-            </a:r>
-            <a:r>
-              <a:rPr lang="zh-CN" altLang="en-US"/>
-              <a:t>v-if是条件渲染指令，它根据表达式的真假来删除和插入元素，它的基本语法如下：</a:t>
-            </a:r>
-            <a:endParaRPr lang="zh-CN" altLang="en-US"/>
-          </a:p>
-          <a:p>
-            <a:pPr marL="0" indent="0" fontAlgn="auto">
-              <a:lnSpc>
-                <a:spcPct val="100000"/>
-              </a:lnSpc>
-              <a:buNone/>
-            </a:pPr>
-            <a:r>
-              <a:rPr lang="en-US" altLang="zh-CN"/>
-              <a:t>	</a:t>
-            </a:r>
-            <a:r>
-              <a:rPr lang="zh-CN" altLang="en-US"/>
-              <a:t>v-if="expression"</a:t>
-            </a:r>
-            <a:endParaRPr lang="zh-CN" altLang="en-US"/>
-          </a:p>
-          <a:p>
-            <a:pPr marL="0" indent="0" fontAlgn="auto">
-              <a:lnSpc>
-                <a:spcPct val="100000"/>
-              </a:lnSpc>
-              <a:buNone/>
-            </a:pPr>
-            <a:r>
-              <a:rPr lang="en-US" altLang="zh-CN"/>
-              <a:t>	</a:t>
-            </a:r>
-            <a:r>
-              <a:rPr lang="zh-CN" altLang="en-US"/>
-              <a:t>expression是一个返回bool值的表达式，表达式可以是一个bool属性，也可以是一个返回bool的运算式。</a:t>
-            </a:r>
-            <a:endParaRPr lang="zh-CN" altLang="en-US"/>
-          </a:p>
-          <a:p>
-            <a:pPr marL="0" indent="0">
-              <a:buNone/>
-            </a:pPr>
-            <a:r>
-              <a:rPr lang="en-US" altLang="zh-CN" sz="1800"/>
-              <a:t>	expression==true  			</a:t>
-            </a:r>
-            <a:r>
-              <a:rPr lang="zh-CN" altLang="zh-CN" sz="1800"/>
-              <a:t>插入</a:t>
-            </a:r>
-            <a:r>
-              <a:rPr lang="en-US" altLang="zh-CN" sz="1800"/>
-              <a:t>DOM</a:t>
-            </a:r>
-            <a:r>
-              <a:rPr lang="zh-CN" altLang="en-US" sz="1800"/>
-              <a:t>；</a:t>
-            </a:r>
-            <a:endParaRPr lang="zh-CN" altLang="en-US" sz="1800"/>
-          </a:p>
-          <a:p>
-            <a:pPr marL="0" indent="0">
-              <a:buNone/>
-            </a:pPr>
-            <a:r>
-              <a:rPr lang="en-US" altLang="zh-CN" sz="1800"/>
-              <a:t>	</a:t>
-            </a:r>
-            <a:r>
-              <a:rPr lang="en-US" altLang="zh-CN" sz="1800">
-                <a:sym typeface="+mn-ea"/>
-              </a:rPr>
-              <a:t>expression==false</a:t>
-            </a:r>
-            <a:r>
-              <a:rPr lang="zh-CN" altLang="zh-CN" sz="1800">
-                <a:sym typeface="+mn-ea"/>
-              </a:rPr>
-              <a:t> </a:t>
-            </a:r>
-            <a:r>
-              <a:rPr lang="en-US" altLang="zh-CN" sz="1800">
-                <a:sym typeface="+mn-ea"/>
-              </a:rPr>
-              <a:t>			</a:t>
-            </a:r>
-            <a:r>
-              <a:rPr lang="zh-CN" altLang="zh-CN" sz="1800">
-                <a:sym typeface="+mn-ea"/>
-              </a:rPr>
-              <a:t>删除</a:t>
-            </a:r>
-            <a:r>
-              <a:rPr lang="en-US" altLang="zh-CN" sz="1800">
-                <a:sym typeface="+mn-ea"/>
-              </a:rPr>
-              <a:t>DOM</a:t>
-            </a:r>
-            <a:r>
-              <a:rPr lang="zh-CN" altLang="en-US" sz="1800">
-                <a:sym typeface="+mn-ea"/>
-              </a:rPr>
-              <a:t>；</a:t>
-            </a:r>
-            <a:endParaRPr lang="zh-CN" altLang="en-US" sz="1800">
+          <a:bodyPr/>
+          <a:p>
+            <a:r>
+              <a:rPr lang="en-US" altLang="en-US"/>
+              <a:t>v-if		</a:t>
+            </a:r>
+            <a:r>
+              <a:rPr lang="en-US" altLang="en-US" sz="2400">
+                <a:latin typeface="宋体" panose="02010600030101010101" pitchFamily="2" charset="-122"/>
+                <a:ea typeface="宋体" panose="02010600030101010101" pitchFamily="2" charset="-122"/>
+              </a:rPr>
+              <a:t>条件渲染指令，它根据表达式的真假来删除和插入元素</a:t>
+            </a:r>
+            <a:endParaRPr lang="zh-CN" altLang="en-US" sz="2400">
+              <a:latin typeface="宋体" panose="02010600030101010101" pitchFamily="2" charset="-122"/>
+              <a:ea typeface="宋体" panose="02010600030101010101" pitchFamily="2" charset="-122"/>
+            </a:endParaRPr>
+          </a:p>
+          <a:p>
+            <a:r>
+              <a:rPr lang="en-US" altLang="en-US" sz="2800">
+                <a:sym typeface="+mn-ea"/>
+              </a:rPr>
+              <a:t>v-else-if</a:t>
+            </a:r>
+            <a:r>
+              <a:rPr lang="en-US" altLang="en-US" sz="2400">
+                <a:latin typeface="宋体" panose="02010600030101010101" pitchFamily="2" charset="-122"/>
+                <a:ea typeface="宋体" panose="02010600030101010101" pitchFamily="2" charset="-122"/>
+                <a:sym typeface="+mn-ea"/>
+              </a:rPr>
+              <a:t>	为</a:t>
+            </a:r>
+            <a:r>
+              <a:rPr lang="en-US" altLang="en-US" sz="2800">
+                <a:sym typeface="+mn-ea"/>
+              </a:rPr>
+              <a:t>v-if</a:t>
+            </a:r>
+            <a:r>
+              <a:rPr lang="en-US" altLang="en-US" sz="2400">
+                <a:latin typeface="宋体" panose="02010600030101010101" pitchFamily="2" charset="-122"/>
+                <a:ea typeface="宋体" panose="02010600030101010101" pitchFamily="2" charset="-122"/>
+                <a:sym typeface="+mn-ea"/>
+              </a:rPr>
+              <a:t>添加一个“</a:t>
+            </a:r>
+            <a:r>
+              <a:rPr lang="en-US" altLang="en-US" sz="2800">
+                <a:sym typeface="+mn-ea"/>
+              </a:rPr>
+              <a:t>else if</a:t>
+            </a:r>
+            <a:r>
+              <a:rPr lang="en-US" altLang="en-US" sz="2400">
+                <a:latin typeface="宋体" panose="02010600030101010101" pitchFamily="2" charset="-122"/>
+                <a:ea typeface="宋体" panose="02010600030101010101" pitchFamily="2" charset="-122"/>
+                <a:sym typeface="+mn-ea"/>
+              </a:rPr>
+              <a:t>块”</a:t>
+            </a:r>
+            <a:endParaRPr lang="en-US" altLang="en-US" sz="2400">
+              <a:latin typeface="宋体" panose="02010600030101010101" pitchFamily="2" charset="-122"/>
+              <a:ea typeface="宋体" panose="02010600030101010101" pitchFamily="2" charset="-122"/>
               <a:sym typeface="+mn-ea"/>
             </a:endParaRPr>
           </a:p>
           <a:p>
-            <a:pPr marL="0" indent="0">
-              <a:buNone/>
-            </a:pPr>
-            <a:r>
-              <a:rPr lang="en-US" altLang="zh-CN" sz="1800">
-                <a:sym typeface="+mn-ea"/>
-              </a:rPr>
-              <a:t>	expression==”adadaqweq”  		</a:t>
-            </a:r>
-            <a:r>
-              <a:rPr lang="zh-CN" altLang="zh-CN" sz="1800">
-                <a:sym typeface="+mn-ea"/>
-              </a:rPr>
-              <a:t>插入</a:t>
-            </a:r>
-            <a:r>
-              <a:rPr lang="en-US" altLang="zh-CN" sz="1800">
-                <a:sym typeface="+mn-ea"/>
-              </a:rPr>
+            <a:r>
+              <a:rPr lang="en-US" altLang="en-US"/>
+              <a:t>v-else	</a:t>
+            </a:r>
+            <a:r>
+              <a:rPr lang="en-US" altLang="en-US" sz="2400">
+                <a:latin typeface="宋体" panose="02010600030101010101" pitchFamily="2" charset="-122"/>
+                <a:ea typeface="宋体" panose="02010600030101010101" pitchFamily="2" charset="-122"/>
+              </a:rPr>
+              <a:t>为</a:t>
+            </a:r>
+            <a:r>
+              <a:rPr lang="en-US" altLang="en-US" sz="2800"/>
+              <a:t>v-if</a:t>
+            </a:r>
+            <a:r>
+              <a:rPr lang="en-US" altLang="en-US" sz="2400">
+                <a:latin typeface="宋体" panose="02010600030101010101" pitchFamily="2" charset="-122"/>
+                <a:ea typeface="宋体" panose="02010600030101010101" pitchFamily="2" charset="-122"/>
+              </a:rPr>
+              <a:t>或</a:t>
+            </a:r>
+            <a:r>
+              <a:rPr lang="en-US" altLang="en-US" sz="2800"/>
+              <a:t>v-else-if</a:t>
+            </a:r>
+            <a:r>
+              <a:rPr lang="en-US" altLang="en-US" sz="2400">
+                <a:latin typeface="宋体" panose="02010600030101010101" pitchFamily="2" charset="-122"/>
+                <a:ea typeface="宋体" panose="02010600030101010101" pitchFamily="2" charset="-122"/>
+              </a:rPr>
+              <a:t>添加一个“</a:t>
+            </a:r>
+            <a:r>
+              <a:rPr lang="en-US" altLang="en-US" sz="2800"/>
+              <a:t>else</a:t>
+            </a:r>
+            <a:r>
+              <a:rPr lang="en-US" altLang="en-US" sz="2400">
+                <a:latin typeface="宋体" panose="02010600030101010101" pitchFamily="2" charset="-122"/>
+                <a:ea typeface="宋体" panose="02010600030101010101" pitchFamily="2" charset="-122"/>
+              </a:rPr>
+              <a:t>块”</a:t>
+            </a:r>
+            <a:endParaRPr lang="en-US" altLang="en-US" sz="2400">
+              <a:latin typeface="宋体" panose="02010600030101010101" pitchFamily="2" charset="-122"/>
+              <a:ea typeface="宋体" panose="02010600030101010101" pitchFamily="2" charset="-122"/>
+            </a:endParaRPr>
+          </a:p>
+          <a:p>
+            <a:r>
+              <a:rPr lang="en-US" altLang="en-US">
+                <a:sym typeface="+mn-ea"/>
+              </a:rPr>
+              <a:t>v-show	</a:t>
+            </a:r>
+            <a:r>
+              <a:rPr lang="en-US" altLang="en-US" sz="2400">
+                <a:latin typeface="宋体" panose="02010600030101010101" pitchFamily="2" charset="-122"/>
+                <a:ea typeface="宋体" panose="02010600030101010101" pitchFamily="2" charset="-122"/>
+                <a:sym typeface="+mn-ea"/>
+              </a:rPr>
+              <a:t>条件渲染指令，它根据表达式的真假为元素设置CSS的</a:t>
+            </a:r>
+            <a:r>
+              <a:rPr lang="en-US" altLang="en-US" sz="2800">
+                <a:sym typeface="+mn-ea"/>
+              </a:rPr>
+              <a:t>style</a:t>
+            </a:r>
+            <a:r>
+              <a:rPr lang="en-US" altLang="en-US" sz="2400">
+                <a:latin typeface="宋体" panose="02010600030101010101" pitchFamily="2" charset="-122"/>
+                <a:ea typeface="宋体" panose="02010600030101010101" pitchFamily="2" charset="-122"/>
+                <a:sym typeface="+mn-ea"/>
+              </a:rPr>
+              <a:t>属性</a:t>
+            </a:r>
+            <a:endParaRPr lang="zh-CN" altLang="en-US"/>
+          </a:p>
+          <a:p>
+            <a:r>
+              <a:rPr lang="en-US" altLang="en-US"/>
+              <a:t>v-for		</a:t>
+            </a:r>
+            <a:r>
+              <a:rPr lang="en-US" altLang="en-US" sz="2400">
+                <a:latin typeface="宋体" panose="02010600030101010101" pitchFamily="2" charset="-122"/>
+                <a:ea typeface="宋体" panose="02010600030101010101" pitchFamily="2" charset="-122"/>
+              </a:rPr>
+              <a:t>基于一个数组渲染一个列表</a:t>
+            </a:r>
+            <a:r>
+              <a:rPr lang="zh-CN" altLang="en-US" sz="2400">
+                <a:latin typeface="宋体" panose="02010600030101010101" pitchFamily="2" charset="-122"/>
+                <a:ea typeface="宋体" panose="02010600030101010101" pitchFamily="2" charset="-122"/>
+              </a:rPr>
+              <a:t>，类似</a:t>
+            </a:r>
+            <a:r>
+              <a:rPr lang="en-US" altLang="en-US" sz="2800"/>
+              <a:t>JavaScript</a:t>
+            </a:r>
+            <a:r>
+              <a:rPr lang="en-US" altLang="en-US" sz="2400">
+                <a:latin typeface="宋体" panose="02010600030101010101" pitchFamily="2" charset="-122"/>
+                <a:ea typeface="宋体" panose="02010600030101010101" pitchFamily="2" charset="-122"/>
+              </a:rPr>
+              <a:t>的遍历语法</a:t>
+            </a:r>
+            <a:endParaRPr lang="en-US" altLang="en-US" sz="2400">
+              <a:latin typeface="宋体" panose="02010600030101010101" pitchFamily="2" charset="-122"/>
+              <a:ea typeface="宋体" panose="02010600030101010101" pitchFamily="2" charset="-122"/>
+            </a:endParaRPr>
+          </a:p>
+          <a:p>
+            <a:r>
+              <a:rPr lang="en-US" altLang="en-US"/>
+              <a:t>v-bind	</a:t>
+            </a:r>
+            <a:r>
+              <a:rPr lang="en-US" altLang="en-US" sz="2400">
+                <a:latin typeface="宋体" panose="02010600030101010101" pitchFamily="2" charset="-122"/>
+                <a:ea typeface="宋体" panose="02010600030101010101" pitchFamily="2" charset="-122"/>
+              </a:rPr>
+              <a:t>通常设置</a:t>
+            </a:r>
+            <a:r>
+              <a:rPr lang="en-US" altLang="en-US" sz="2800"/>
+              <a:t>HTML</a:t>
+            </a:r>
+            <a:r>
+              <a:rPr lang="en-US" altLang="en-US" sz="2400">
+                <a:latin typeface="宋体" panose="02010600030101010101" pitchFamily="2" charset="-122"/>
+                <a:ea typeface="宋体" panose="02010600030101010101" pitchFamily="2" charset="-122"/>
+              </a:rPr>
+              <a:t>元素的特性（</a:t>
+            </a:r>
+            <a:r>
+              <a:rPr lang="en-US" altLang="en-US" sz="2800"/>
+              <a:t>attribute</a:t>
+            </a:r>
+            <a:r>
+              <a:rPr lang="en-US" altLang="en-US" sz="2400">
+                <a:latin typeface="宋体" panose="02010600030101010101" pitchFamily="2" charset="-122"/>
+                <a:ea typeface="宋体" panose="02010600030101010101" pitchFamily="2" charset="-122"/>
+              </a:rPr>
+              <a:t>）</a:t>
+            </a:r>
+            <a:endParaRPr lang="zh-CN" altLang="en-US"/>
+          </a:p>
+          <a:p>
+            <a:r>
+              <a:rPr lang="en-US" altLang="en-US"/>
+              <a:t>v-on		</a:t>
+            </a:r>
+            <a:r>
+              <a:rPr lang="en-US" altLang="en-US" sz="2400">
+                <a:latin typeface="宋体" panose="02010600030101010101" pitchFamily="2" charset="-122"/>
+                <a:ea typeface="宋体" panose="02010600030101010101" pitchFamily="2" charset="-122"/>
+              </a:rPr>
+              <a:t>监听</a:t>
+            </a:r>
+            <a:r>
+              <a:rPr lang="en-US" altLang="en-US" sz="2800"/>
               <a:t>DOM</a:t>
             </a:r>
             <a:r>
-              <a:rPr lang="zh-CN" altLang="en-US" sz="1800">
-                <a:sym typeface="+mn-ea"/>
-              </a:rPr>
-              <a:t>；</a:t>
-            </a:r>
-            <a:endParaRPr lang="zh-CN" altLang="en-US" sz="1800">
-              <a:sym typeface="+mn-ea"/>
-            </a:endParaRPr>
-          </a:p>
-          <a:p>
-            <a:pPr marL="0" indent="0">
-              <a:buNone/>
-            </a:pPr>
-            <a:r>
-              <a:rPr lang="en-US" altLang="zh-CN" sz="1800">
-                <a:sym typeface="+mn-ea"/>
-              </a:rPr>
-              <a:t>	expression==”” 			</a:t>
-            </a:r>
-            <a:r>
-              <a:rPr lang="zh-CN" altLang="zh-CN" sz="1800">
-                <a:sym typeface="+mn-ea"/>
-              </a:rPr>
-              <a:t>删除</a:t>
-            </a:r>
-            <a:r>
-              <a:rPr lang="en-US" altLang="zh-CN" sz="1800">
-                <a:sym typeface="+mn-ea"/>
-              </a:rPr>
-              <a:t>DOM</a:t>
-            </a:r>
-            <a:r>
-              <a:rPr lang="zh-CN" altLang="en-US" sz="1800">
-                <a:sym typeface="+mn-ea"/>
-              </a:rPr>
-              <a:t>；</a:t>
-            </a:r>
-            <a:endParaRPr lang="en-US" altLang="zh-CN" sz="1800">
-              <a:sym typeface="+mn-ea"/>
-            </a:endParaRPr>
-          </a:p>
-          <a:p>
-            <a:pPr marL="0" indent="0">
-              <a:buNone/>
-            </a:pPr>
-            <a:r>
-              <a:rPr lang="en-US" altLang="zh-CN"/>
-              <a:t>	v-if指令是根据条件表达式的值来执行元素的插入或者删除行为。</a:t>
-            </a:r>
-            <a:endParaRPr lang="en-US" altLang="zh-CN"/>
+              <a:rPr lang="en-US" altLang="en-US" sz="2400">
+                <a:latin typeface="宋体" panose="02010600030101010101" pitchFamily="2" charset="-122"/>
+                <a:ea typeface="宋体" panose="02010600030101010101" pitchFamily="2" charset="-122"/>
+              </a:rPr>
+              <a:t>事件</a:t>
+            </a:r>
+            <a:endParaRPr lang="en-US" altLang="en-US"/>
           </a:p>
         </p:txBody>
       </p:sp>
@@ -3608,7 +3443,7 @@
                 <a:latin typeface="楷体" panose="02010609060101010101" charset="-122"/>
                 <a:ea typeface="楷体" panose="02010609060101010101" charset="-122"/>
               </a:rPr>
-              <a:t>v-else-if</a:t>
+              <a:t>v-if</a:t>
             </a:r>
             <a:r>
               <a:rPr lang="zh-CN" altLang="en-US">
@@ -3636,8 +3471,8 @@
         </p:nvSpPr>
         <p:spPr>
           <a:xfrm>
-            <a:off x="838200" y="2188210"/>
-            <a:ext cx="10515600" cy="4351338"/>
+            <a:off x="772160" y="1691640"/>
+            <a:ext cx="10515600" cy="4543425"/>
           </a:xfrm>
         </p:spPr>
         <p:txBody>
@@ -3656,46 +3491,186 @@
               <a:t>	</a:t>
             </a:r>
             <a:r>
-              <a:rPr lang="en-US" altLang="zh-CN">
-                <a:sym typeface="+mn-ea"/>
-              </a:rPr>
-              <a:t>v-else-if指令为v-if</a:t>
-            </a:r>
-            <a:r>
-              <a:rPr lang="zh-CN" altLang="zh-CN">
-                <a:sym typeface="+mn-ea"/>
-              </a:rPr>
-              <a:t>或v-else-if</a:t>
-            </a:r>
-            <a:r>
-              <a:rPr lang="en-US" altLang="zh-CN">
-                <a:sym typeface="+mn-ea"/>
-              </a:rPr>
-              <a:t>添加一个“else-if块”。v-else-if元素必须立即跟在v-if</a:t>
-            </a:r>
-            <a:r>
-              <a:rPr lang="zh-CN" altLang="zh-CN">
-                <a:sym typeface="+mn-ea"/>
-              </a:rPr>
-              <a:t>或v-else-if元素</a:t>
-            </a:r>
-            <a:r>
-              <a:rPr lang="en-US" altLang="zh-CN">
-                <a:sym typeface="+mn-ea"/>
-              </a:rPr>
-              <a:t>的后面</a:t>
-            </a:r>
-            <a:r>
-              <a:rPr lang="zh-CN" altLang="zh-CN">
-                <a:sym typeface="+mn-ea"/>
-              </a:rPr>
-              <a:t>，</a:t>
-            </a:r>
-            <a:r>
-              <a:rPr lang="en-US" altLang="zh-CN">
-                <a:sym typeface="+mn-ea"/>
-              </a:rPr>
-              <a:t>否则它不能被识别。</a:t>
+              <a:rPr lang="zh-CN" altLang="en-US"/>
+              <a:t>v-if是条件渲染指令，它根据表达式的真假来删除和插入元素，它的基本语法如下：</a:t>
+            </a:r>
+            <a:endParaRPr lang="zh-CN" altLang="en-US"/>
+          </a:p>
+          <a:p>
+            <a:pPr marL="0" indent="0" fontAlgn="auto">
+              <a:lnSpc>
+                <a:spcPct val="100000"/>
+              </a:lnSpc>
+              <a:buNone/>
+            </a:pPr>
+            <a:r>
+              <a:rPr lang="en-US" altLang="zh-CN"/>
+              <a:t>	</a:t>
+            </a:r>
+            <a:r>
+              <a:rPr lang="zh-CN" altLang="en-US"/>
+              <a:t>v-if="expression"</a:t>
+            </a:r>
+            <a:endParaRPr lang="zh-CN" altLang="en-US"/>
+          </a:p>
+          <a:p>
+            <a:pPr marL="0" indent="0" fontAlgn="auto">
+              <a:lnSpc>
+                <a:spcPct val="100000"/>
+              </a:lnSpc>
+              <a:buNone/>
+            </a:pPr>
+            <a:r>
+              <a:rPr lang="en-US" altLang="zh-CN"/>
+              <a:t>	</a:t>
+            </a:r>
+            <a:r>
+              <a:rPr lang="zh-CN" altLang="en-US"/>
+              <a:t>expression是一个返回bool值的表达式，表达式可以是一个bool属性，也可以是一个返回bool的运算式。</a:t>
+            </a:r>
+            <a:endParaRPr lang="zh-CN" altLang="en-US"/>
+          </a:p>
+          <a:p>
+            <a:pPr marL="0" indent="0">
+              <a:buNone/>
+            </a:pPr>
+            <a:r>
+              <a:rPr lang="en-US" altLang="zh-CN" sz="1800"/>
+              <a:t>	expression==true  			</a:t>
+            </a:r>
+            <a:r>
+              <a:rPr lang="zh-CN" altLang="zh-CN" sz="1800"/>
+              <a:t>插入</a:t>
+            </a:r>
+            <a:r>
+              <a:rPr lang="en-US" altLang="zh-CN" sz="1800"/>
+              <a:t>DOM</a:t>
+            </a:r>
+            <a:r>
+              <a:rPr lang="zh-CN" altLang="en-US" sz="1800"/>
+              <a:t>；</a:t>
+            </a:r>
+            <a:endParaRPr lang="zh-CN" altLang="en-US" sz="1800"/>
+          </a:p>
+          <a:p>
+            <a:pPr marL="0" indent="0">
+              <a:buNone/>
+            </a:pPr>
+            <a:r>
+              <a:rPr lang="en-US" altLang="zh-CN" sz="1800"/>
+              <a:t>	</a:t>
+            </a:r>
+            <a:r>
+              <a:rPr lang="en-US" altLang="zh-CN" sz="1800">
+                <a:sym typeface="+mn-ea"/>
+              </a:rPr>
+              <a:t>expression==false</a:t>
+            </a:r>
+            <a:r>
+              <a:rPr lang="zh-CN" altLang="zh-CN" sz="1800">
+                <a:sym typeface="+mn-ea"/>
+              </a:rPr>
+              <a:t> </a:t>
+            </a:r>
+            <a:r>
+              <a:rPr lang="en-US" altLang="zh-CN" sz="1800">
+                <a:sym typeface="+mn-ea"/>
+              </a:rPr>
+              <a:t>			</a:t>
+            </a:r>
+            <a:r>
+              <a:rPr lang="zh-CN" altLang="zh-CN" sz="1800">
+                <a:sym typeface="+mn-ea"/>
+              </a:rPr>
+              <a:t>删除</a:t>
+            </a:r>
+            <a:r>
+              <a:rPr lang="en-US" altLang="zh-CN" sz="1800">
+                <a:sym typeface="+mn-ea"/>
+              </a:rPr>
+              <a:t>DOM</a:t>
+            </a:r>
+            <a:r>
+              <a:rPr lang="zh-CN" altLang="en-US" sz="1800">
+                <a:sym typeface="+mn-ea"/>
+              </a:rPr>
+              <a:t>；</a:t>
+            </a:r>
+            <a:endParaRPr lang="zh-CN" altLang="en-US" sz="1800">
+              <a:sym typeface="+mn-ea"/>
+            </a:endParaRPr>
+          </a:p>
+          <a:p>
+            <a:pPr marL="0" indent="0">
+              <a:buNone/>
+            </a:pPr>
+            <a:r>
+              <a:rPr lang="en-US" altLang="zh-CN" sz="1800">
+                <a:sym typeface="+mn-ea"/>
+              </a:rPr>
+              <a:t>	expression==”adadaqweq”  		</a:t>
+            </a:r>
+            <a:r>
+              <a:rPr lang="zh-CN" altLang="zh-CN" sz="1800">
+                <a:sym typeface="+mn-ea"/>
+              </a:rPr>
+              <a:t>插入</a:t>
+            </a:r>
+            <a:r>
+              <a:rPr lang="en-US" altLang="zh-CN" sz="1800">
+                <a:sym typeface="+mn-ea"/>
+              </a:rPr>
+              <a:t>DOM</a:t>
+            </a:r>
+            <a:r>
+              <a:rPr lang="zh-CN" altLang="en-US" sz="1800">
+                <a:sym typeface="+mn-ea"/>
+              </a:rPr>
+              <a:t>；</a:t>
+            </a:r>
+            <a:endParaRPr lang="zh-CN" altLang="en-US" sz="1800">
+              <a:sym typeface="+mn-ea"/>
+            </a:endParaRPr>
+          </a:p>
+          <a:p>
+            <a:pPr marL="0" indent="0">
+              <a:buNone/>
+            </a:pPr>
+            <a:r>
+              <a:rPr lang="en-US" altLang="zh-CN" sz="1800">
+                <a:sym typeface="+mn-ea"/>
+              </a:rPr>
+              <a:t>	expression==”” 			</a:t>
+            </a:r>
+            <a:r>
+              <a:rPr lang="zh-CN" altLang="zh-CN" sz="1800">
+                <a:sym typeface="+mn-ea"/>
+              </a:rPr>
+              <a:t>删除</a:t>
+            </a:r>
+            <a:r>
+              <a:rPr lang="en-US" altLang="zh-CN" sz="1800">
+                <a:sym typeface="+mn-ea"/>
+              </a:rPr>
+              <a:t>DOM</a:t>
+            </a:r>
+            <a:r>
+              <a:rPr lang="zh-CN" altLang="en-US" sz="1800">
+                <a:sym typeface="+mn-ea"/>
+              </a:rPr>
+              <a:t>；</a:t>
+            </a:r>
+            <a:endParaRPr lang="en-US" altLang="zh-CN" sz="1800">
+              <a:sym typeface="+mn-ea"/>
+            </a:endParaRPr>
+          </a:p>
+          <a:p>
+            <a:pPr marL="0" indent="0">
+              <a:buNone/>
+            </a:pPr>
+            <a:r>
+              <a:rPr lang="en-US" altLang="zh-CN"/>
+              <a:t>	v-if指令是根据条件表达式的值来执行元素的插入或者删除行为。</a:t>
             </a:r>
             <a:endParaRPr lang="en-US" altLang="zh-CN"/>
           </a:p>
@@ -3738,16 +3713,16 @@
                 <a:latin typeface="楷体" panose="02010609060101010101" charset="-122"/>
                 <a:ea typeface="楷体" panose="02010609060101010101" charset="-122"/>
               </a:rPr>
-              <a:t>v-else</a:t>
-            </a:r>
-            <a:r>
-              <a:rPr lang="zh-CN" altLang="zh-CN">
+              <a:t>v-else-if</a:t>
+            </a:r>
+            <a:r>
+              <a:rPr lang="zh-CN" altLang="en-US">
                 <a:latin typeface="楷体" panose="02010609060101010101" charset="-122"/>
                 <a:ea typeface="楷体" panose="02010609060101010101" charset="-122"/>
               </a:rPr>
               <a:t>指令：</a:t>
             </a:r>
-            <a:endParaRPr lang="zh-CN" altLang="zh-CN">
+            <a:endParaRPr lang="zh-CN" altLang="en-US">
               <a:latin typeface="楷体" panose="02010609060101010101" charset="-122"/>
               <a:ea typeface="楷体" panose="02010609060101010101" charset="-122"/>
             </a:endParaRPr>
@@ -3764,24 +3739,44 @@
             <p:ph idx="1"/>
           </p:nvPr>
         </p:nvSpPr>
-        <p:spPr/>
-        <p:txBody>
-          <a:bodyPr/>
-          <a:p>
-            <a:pPr marL="0" indent="0">
+        <p:spPr>
+          <a:xfrm>
+            <a:off x="838200" y="2188210"/>
+            <a:ext cx="10515600" cy="4351338"/>
+          </a:xfrm>
+        </p:spPr>
+        <p:txBody>
+          <a:bodyPr>
+            <a:normAutofit lnSpcReduction="20000"/>
+          </a:bodyPr>
+          <a:p>
+            <a:pPr marL="0" indent="0" fontAlgn="auto">
+              <a:lnSpc>
+                <a:spcPct val="100000"/>
+              </a:lnSpc>
               <a:buNone/>
             </a:pPr>
             <a:r>
               <a:rPr lang="en-US" altLang="zh-CN"/>
-              <a:t>	v-else指令为v-if</a:t>
-            </a:r>
-            <a:r>
-              <a:rPr lang="zh-CN" altLang="zh-CN"/>
+              <a:t>	</a:t>
+            </a:r>
+            <a:r>
+              <a:rPr lang="en-US" altLang="zh-CN">
+                <a:sym typeface="+mn-ea"/>
+              </a:rPr>
+              <a:t>v-else-if指令为v-if</a:t>
+            </a:r>
+            <a:r>
+              <a:rPr lang="zh-CN" altLang="zh-CN">
+                <a:sym typeface="+mn-ea"/>
+              </a:rPr>
               <a:t>或v-else-if</a:t>
             </a:r>
             <a:r>
-              <a:rPr lang="en-US" altLang="zh-CN"/>
-              <a:t>添加一个“else块”。v-else元素必须立即跟在v-if</a:t>
+              <a:rPr lang="en-US" altLang="zh-CN">
+                <a:sym typeface="+mn-ea"/>
+              </a:rPr>
+              <a:t>添加一个“else-if块”。v-else-if元素必须立即跟在v-if</a:t>
             </a:r>
             <a:r>
               <a:rPr lang="zh-CN" altLang="zh-CN">
@@ -3790,15 +3785,21 @@
               <a:t>或v-else-if元素</a:t>
             </a:r>
             <a:r>
-              <a:rPr lang="en-US" altLang="zh-CN"/>
+              <a:rPr lang="en-US" altLang="zh-CN">
+                <a:sym typeface="+mn-ea"/>
+              </a:rPr>
               <a:t>的后面</a:t>
             </a:r>
             <a:r>
-              <a:rPr lang="zh-CN" altLang="en-US"/>
+              <a:rPr lang="zh-CN" altLang="zh-CN">
+                <a:sym typeface="+mn-ea"/>
+              </a:rPr>
               <a:t>，</a:t>
             </a:r>
             <a:r>
-              <a:rPr lang="en-US" altLang="zh-CN"/>
+              <a:rPr lang="en-US" altLang="zh-CN">
+                <a:sym typeface="+mn-ea"/>
+              </a:rPr>
               <a:t>否则它不能被识别。</a:t>
             </a:r>
             <a:endParaRPr lang="en-US" altLang="zh-CN"/>
@@ -3842,16 +3843,16 @@
                 <a:latin typeface="楷体" panose="02010609060101010101" charset="-122"/>
                 <a:ea typeface="楷体" panose="02010609060101010101" charset="-122"/>
               </a:rPr>
-              <a:t>v-show</a:t>
-            </a:r>
-            <a:r>
-              <a:rPr lang="zh-CN" altLang="en-US">
+              <a:t>v-else</a:t>
+            </a:r>
+            <a:r>
+              <a:rPr lang="zh-CN" altLang="zh-CN">
                 <a:latin typeface="楷体" panose="02010609060101010101" charset="-122"/>
                 <a:ea typeface="楷体" panose="02010609060101010101" charset="-122"/>
               </a:rPr>
               <a:t>指令：</a:t>
             </a:r>
-            <a:endParaRPr lang="zh-CN" altLang="en-US">
+            <a:endParaRPr lang="zh-CN" altLang="zh-CN">
               <a:latin typeface="楷体" panose="02010609060101010101" charset="-122"/>
               <a:ea typeface="楷体" panose="02010609060101010101" charset="-122"/>
             </a:endParaRPr>
@@ -3877,7 +3878,33 @@
             </a:pPr>
             <a:r>
               <a:rPr lang="en-US" altLang="zh-CN"/>
-              <a:t>	v-show也是条件渲染指令，和v-if指令不同的是，使用v-show指令的元素始终会被渲染到HTML，它只是简单地为元素设置CSS的style属性。</a:t>
+              <a:t>	v-else指令为v-if</a:t>
+            </a:r>
+            <a:r>
+              <a:rPr lang="zh-CN" altLang="zh-CN"/>
+              <a:t>或v-else-if</a:t>
+            </a:r>
+            <a:r>
+              <a:rPr lang="en-US" altLang="zh-CN"/>
+              <a:t>添加一个“else块”。v-else元素必须立即跟在v-if</a:t>
+            </a:r>
+            <a:r>
+              <a:rPr lang="zh-CN" altLang="zh-CN">
+                <a:sym typeface="+mn-ea"/>
+              </a:rPr>
+              <a:t>或v-else-if元素</a:t>
+            </a:r>
+            <a:r>
+              <a:rPr lang="en-US" altLang="zh-CN"/>
+              <a:t>的后面</a:t>
+            </a:r>
+            <a:r>
+              <a:rPr lang="zh-CN" altLang="en-US"/>
+              <a:t>，</a:t>
+            </a:r>
+            <a:r>
+              <a:rPr lang="en-US" altLang="zh-CN"/>
+              <a:t>否则它不能被识别。</a:t>
             </a:r>
             <a:endParaRPr lang="en-US" altLang="zh-CN"/>
           </a:p>
@@ -3916,57 +3943,48 @@
           <a:bodyPr/>
           <a:p>
             <a:r>
+              <a:rPr lang="en-US" altLang="zh-CN">
+                <a:latin typeface="楷体" panose="02010609060101010101" charset="-122"/>
+                <a:ea typeface="楷体" panose="02010609060101010101" charset="-122"/>
+              </a:rPr>
+              <a:t>v-show</a:t>
+            </a:r>
+            <a:r>
+              <a:rPr lang="zh-CN" altLang="en-US">
+                <a:latin typeface="楷体" panose="02010609060101010101" charset="-122"/>
+                <a:ea typeface="楷体" panose="02010609060101010101" charset="-122"/>
+              </a:rPr>
+              <a:t>指令：</a:t>
+            </a:r>
+            <a:endParaRPr lang="zh-CN" altLang="en-US">
+              <a:latin typeface="楷体" panose="02010609060101010101" charset="-122"/>
+              <a:ea typeface="楷体" panose="02010609060101010101" charset="-122"/>
+            </a:endParaRPr>
+          </a:p>
+        </p:txBody>
+      </p:sp>
+      <p:sp>
+        <p:nvSpPr>
+          <p:cNvPr id="3" name="内容占位符 2"/>
+          <p:cNvSpPr>
+            <a:spLocks noGrp="1"/>
+          </p:cNvSpPr>
+          <p:nvPr>
+            <p:ph idx="1"/>
+          </p:nvPr>
+        </p:nvSpPr>
+        <p:spPr/>
+        <p:txBody>
+          <a:bodyPr/>
+          <a:p>
+            <a:pPr marL="0" indent="0">
+              <a:buNone/>
+            </a:pPr>
+            <a:r>
               <a:rPr lang="en-US" altLang="zh-CN"/>
-              <a:t>v-for</a:t>
-            </a:r>
-            <a:r>
-              <a:rPr lang="zh-CN" altLang="zh-CN"/>
-              <a:t>指令：</a:t>
-            </a:r>
-            <a:endParaRPr lang="zh-CN" altLang="zh-CN"/>
-          </a:p>
-        </p:txBody>
-      </p:sp>
-      <p:sp>
-        <p:nvSpPr>
-          <p:cNvPr id="3" name="内容占位符 2"/>
-          <p:cNvSpPr>
-            <a:spLocks noGrp="1"/>
-          </p:cNvSpPr>
-          <p:nvPr>
-            <p:ph idx="1"/>
-          </p:nvPr>
-        </p:nvSpPr>
-        <p:spPr/>
-        <p:txBody>
-          <a:bodyPr/>
-          <a:p>
-            <a:r>
-              <a:rPr lang="zh-CN" altLang="en-US"/>
-              <a:t>v-for指令基于一个数组渲染一个列表，它和JavaScript的遍历语法相似：</a:t>
-            </a:r>
-            <a:endParaRPr lang="zh-CN" altLang="en-US"/>
-          </a:p>
-          <a:p>
-            <a:pPr marL="0" indent="0">
-              <a:buNone/>
-            </a:pPr>
-            <a:r>
-              <a:rPr lang="en-US" altLang="zh-CN"/>
-              <a:t>	</a:t>
-            </a:r>
-            <a:r>
-              <a:rPr lang="zh-CN" altLang="en-US"/>
-              <a:t>v-for="item in items"</a:t>
-            </a:r>
-            <a:endParaRPr lang="zh-CN" altLang="en-US"/>
-          </a:p>
-          <a:p>
-            <a:r>
-              <a:rPr lang="zh-CN" altLang="en-US"/>
-              <a:t>items是一个数组，item是当前被遍历的数组元素。</a:t>
-            </a:r>
-            <a:endParaRPr lang="zh-CN" altLang="en-US"/>
+              <a:t>	v-show也是条件渲染指令，和v-if指令不同的是，使用v-show指令的元素始终会被渲染到HTML，它只是简单地为元素设置CSS的style属性。</a:t>
+            </a:r>
+            <a:endParaRPr lang="en-US" altLang="zh-CN"/>
           </a:p>
         </p:txBody>
       </p:sp>
@@ -4004,7 +4022,7 @@
           <a:p>
             <a:r>
               <a:rPr lang="en-US" altLang="zh-CN"/>
-              <a:t>v-bind</a:t>
+              <a:t>v-for</a:t>
             </a:r>
             <a:r>
               <a:rPr lang="zh-CN" altLang="zh-CN"/>
@@ -4030,104 +4048,28 @@
           <a:p>
             <a:r>
               <a:rPr lang="zh-CN" altLang="en-US"/>
-              <a:t>动态地绑定一个或多个特性</a:t>
-            </a:r>
+              <a:t>v-for指令基于一个数组渲染一个列表，它和JavaScript的遍历语法相似：</a:t>
+            </a:r>
+            <a:endParaRPr lang="zh-CN" altLang="en-US"/>
+          </a:p>
+          <a:p>
+            <a:pPr marL="0" indent="0">
+              <a:buNone/>
+            </a:pPr>
             <a:r>
               <a:rPr lang="en-US" altLang="zh-CN"/>
-              <a:t>(</a:t>
-            </a:r>
-            <a:r>
-              <a:rPr lang="en-US" altLang="zh-CN">
-                <a:sym typeface="+mn-ea"/>
-              </a:rPr>
-              <a:t>attribute</a:t>
-            </a:r>
-            <a:r>
-              <a:rPr lang="en-US" altLang="zh-CN"/>
-              <a:t>)</a:t>
-            </a:r>
-            <a:r>
-              <a:rPr lang="zh-CN" altLang="en-US"/>
-              <a:t>，或一个组件 prop 到表达式</a:t>
-            </a:r>
-            <a:endParaRPr lang="zh-CN" altLang="en-US"/>
-          </a:p>
-          <a:p>
-            <a:pPr lvl="1"/>
-            <a:r>
-              <a:rPr lang="zh-CN" altLang="en-US"/>
-              <a:t>v-bind:</a:t>
-            </a:r>
-            <a:r>
-              <a:rPr lang="en-US" altLang="zh-CN"/>
-              <a:t>argument</a:t>
-            </a:r>
-            <a:r>
-              <a:rPr lang="zh-CN" altLang="en-US"/>
-              <a:t>="</a:t>
-            </a:r>
-            <a:r>
-              <a:rPr lang="zh-CN" altLang="en-US">
-                <a:sym typeface="+mn-ea"/>
-              </a:rPr>
-              <a:t>expression</a:t>
-            </a:r>
-            <a:r>
-              <a:rPr lang="zh-CN" altLang="en-US"/>
-              <a:t>"</a:t>
-            </a:r>
-            <a:endParaRPr lang="zh-CN" altLang="en-US"/>
-          </a:p>
-          <a:p>
-            <a:pPr lvl="1"/>
-            <a:r>
-              <a:rPr lang="en-US" altLang="zh-CN"/>
-              <a:t>:</a:t>
-            </a:r>
-            <a:r>
-              <a:rPr lang="en-US" altLang="zh-CN">
-                <a:sym typeface="+mn-ea"/>
-              </a:rPr>
-              <a:t>argument</a:t>
-            </a:r>
-            <a:r>
-              <a:rPr lang="zh-CN" altLang="en-US">
-                <a:sym typeface="+mn-ea"/>
-              </a:rPr>
-              <a:t>="</a:t>
-            </a:r>
-            <a:r>
-              <a:rPr lang="zh-CN" altLang="en-US">
-                <a:sym typeface="+mn-ea"/>
-              </a:rPr>
-              <a:t>expression</a:t>
-            </a:r>
-            <a:r>
-              <a:rPr lang="zh-CN" altLang="en-US">
-                <a:sym typeface="+mn-ea"/>
-              </a:rPr>
-              <a:t>"        </a:t>
-            </a:r>
-            <a:r>
-              <a:rPr lang="en-US" altLang="zh-CN">
-                <a:sym typeface="+mn-ea"/>
-              </a:rPr>
-              <a:t>--</a:t>
-            </a:r>
-            <a:r>
-              <a:rPr lang="zh-CN" altLang="zh-CN">
-                <a:sym typeface="+mn-ea"/>
-              </a:rPr>
-              <a:t>缩写</a:t>
-            </a:r>
-            <a:endParaRPr lang="zh-CN" altLang="zh-CN">
-              <a:sym typeface="+mn-ea"/>
-            </a:endParaRPr>
-          </a:p>
-          <a:p>
-            <a:r>
-              <a:rPr lang="zh-CN" altLang="en-US"/>
-              <a:t>在绑定 class 或 style 特性时，支持其它类型的值，如数组或对象。</a:t>
+              <a:t>	</a:t>
+            </a:r>
+            <a:r>
+              <a:rPr lang="zh-CN" altLang="en-US"/>
+              <a:t>v-for="item in items"</a:t>
+            </a:r>
+            <a:endParaRPr lang="zh-CN" altLang="en-US"/>
+          </a:p>
+          <a:p>
+            <a:r>
+              <a:rPr lang="zh-CN" altLang="en-US"/>
+              <a:t>items是一个数组，item是当前被遍历的数组元素。</a:t>
             </a:r>
             <a:endParaRPr lang="zh-CN" altLang="en-US"/>
           </a:p>
@@ -4167,13 +4109,13 @@
           <a:p>
             <a:r>
               <a:rPr lang="en-US" altLang="zh-CN"/>
-              <a:t>v-on</a:t>
-            </a:r>
-            <a:r>
-              <a:rPr lang="zh-CN" altLang="en-US"/>
+              <a:t>v-bind</a:t>
+            </a:r>
+            <a:r>
+              <a:rPr lang="zh-CN" altLang="zh-CN"/>
               <a:t>指令：</a:t>
             </a:r>
-            <a:endParaRPr lang="zh-CN" altLang="en-US"/>
+            <a:endParaRPr lang="zh-CN" altLang="zh-CN"/>
           </a:p>
         </p:txBody>
       </p:sp>
@@ -4193,49 +4135,71 @@
           <a:p>
             <a:r>
               <a:rPr lang="zh-CN" altLang="en-US"/>
-              <a:t>v-on指令用于给监听DOM事件，它的用语法和v-bind是类似的，例如监听&lt;a&gt;元素的点击事件：</a:t>
-            </a:r>
-            <a:endParaRPr lang="zh-CN" altLang="en-US"/>
-          </a:p>
-          <a:p>
-            <a:pPr marL="0" indent="0">
-              <a:buNone/>
-            </a:pPr>
+              <a:t>动态地绑定一个或多个特性</a:t>
+            </a:r>
             <a:r>
               <a:rPr lang="en-US" altLang="zh-CN"/>
-              <a:t>	</a:t>
-            </a:r>
-            <a:r>
-              <a:rPr lang="zh-CN" altLang="en-US"/>
-              <a:t>&lt;a v-on:click="doSomething"&gt;</a:t>
-            </a:r>
-            <a:endParaRPr lang="zh-CN" altLang="en-US"/>
-          </a:p>
-          <a:p>
-            <a:pPr marL="0" indent="0">
-              <a:buNone/>
-            </a:pPr>
+              <a:t>(</a:t>
+            </a:r>
+            <a:r>
+              <a:rPr lang="en-US" altLang="zh-CN">
+                <a:sym typeface="+mn-ea"/>
+              </a:rPr>
+              <a:t>attribute</a:t>
+            </a:r>
             <a:r>
               <a:rPr lang="en-US" altLang="zh-CN"/>
-              <a:t>	</a:t>
+              <a:t>)</a:t>
+            </a:r>
+            <a:r>
+              <a:rPr lang="zh-CN" altLang="en-US"/>
+              <a:t>，或一个组件 prop 到表达式</a:t>
+            </a:r>
+            <a:endParaRPr lang="zh-CN" altLang="en-US"/>
+          </a:p>
+          <a:p>
+            <a:pPr lvl="1"/>
+            <a:r>
+              <a:rPr lang="zh-CN" altLang="en-US"/>
+              <a:t>v-bind:</a:t>
+            </a:r>
+            <a:r>
+              <a:rPr lang="en-US" altLang="zh-CN"/>
+              <a:t>argument</a:t>
+            </a:r>
+            <a:r>
+              <a:rPr lang="zh-CN" altLang="en-US"/>
+              <a:t>="</a:t>
             </a:r>
             <a:r>
               <a:rPr lang="zh-CN" altLang="en-US">
                 <a:sym typeface="+mn-ea"/>
               </a:rPr>
-              <a:t>&lt;a </a:t>
+              <a:t>expression</a:t>
+            </a:r>
+            <a:r>
+              <a:rPr lang="zh-CN" altLang="en-US"/>
+              <a:t>"</a:t>
+            </a:r>
+            <a:endParaRPr lang="zh-CN" altLang="en-US"/>
+          </a:p>
+          <a:p>
+            <a:pPr lvl="1"/>
+            <a:r>
+              <a:rPr lang="en-US" altLang="zh-CN"/>
+              <a:t>:</a:t>
             </a:r>
             <a:r>
               <a:rPr lang="en-US" altLang="zh-CN">
                 <a:sym typeface="+mn-ea"/>
               </a:rPr>
-              <a:t>@</a:t>
+              <a:t>argument</a:t>
             </a:r>
             <a:r>
               <a:rPr lang="zh-CN" altLang="en-US">
                 <a:sym typeface="+mn-ea"/>
               </a:rPr>
-              <a:t>click="doSomething"&gt;     </a:t>
+              <a:t>="expression"        </a:t>
             </a:r>
             <a:r>
               <a:rPr lang="en-US" altLang="zh-CN">
@@ -4256,14 +4220,7 @@
           <a:p>
             <a:r>
               <a:rPr lang="zh-CN" altLang="en-US"/>
-              <a:t>有两种形式调用方法：绑定一个方法（让事件指向方法的引用），或者使用内联语句。</a:t>
-            </a:r>
-            <a:endParaRPr lang="zh-CN" altLang="en-US"/>
-          </a:p>
-          <a:p>
-            <a:r>
-              <a:rPr lang="zh-CN" altLang="en-US"/>
-              <a:t>用在普通元素上时，只能监听 原生 DOM 事件。用在自定义元素组件上时，也可以监听子组件触发的自定义事件。</a:t>
+              <a:t>在绑定 class 或 style 特性时，支持其它类型的值，如数组或对象。</a:t>
             </a:r>
             <a:endParaRPr lang="zh-CN" altLang="en-US"/>
           </a:p>
@@ -4334,8 +4291,8 @@
         </p:nvSpPr>
         <p:spPr>
           <a:xfrm>
-            <a:off x="2319020" y="2219960"/>
-            <a:ext cx="7553960" cy="4351655"/>
+            <a:off x="2043430" y="1825625"/>
+            <a:ext cx="7829550" cy="4745990"/>
           </a:xfrm>
         </p:spPr>
         <p:txBody>
@@ -4421,6 +4378,142 @@
           <a:p>
             <a:r>
               <a:rPr lang="en-US" altLang="zh-CN"/>
+              <a:t>v-on</a:t>
+            </a:r>
+            <a:r>
+              <a:rPr lang="zh-CN" altLang="en-US"/>
+              <a:t>指令：</a:t>
+            </a:r>
+            <a:endParaRPr lang="zh-CN" altLang="en-US"/>
+          </a:p>
+        </p:txBody>
+      </p:sp>
+      <p:sp>
+        <p:nvSpPr>
+          <p:cNvPr id="3" name="内容占位符 2"/>
+          <p:cNvSpPr>
+            <a:spLocks noGrp="1"/>
+          </p:cNvSpPr>
+          <p:nvPr>
+            <p:ph idx="1"/>
+          </p:nvPr>
+        </p:nvSpPr>
+        <p:spPr/>
+        <p:txBody>
+          <a:bodyPr/>
+          <a:p>
+            <a:r>
+              <a:rPr lang="zh-CN" altLang="en-US"/>
+              <a:t>v-on指令用于给监听DOM事件，它的用语法和v-bind是类似的，例如监听&lt;a&gt;元素的点击事件：</a:t>
+            </a:r>
+            <a:endParaRPr lang="zh-CN" altLang="en-US"/>
+          </a:p>
+          <a:p>
+            <a:pPr marL="0" indent="0">
+              <a:buNone/>
+            </a:pPr>
+            <a:r>
+              <a:rPr lang="en-US" altLang="zh-CN"/>
+              <a:t>	</a:t>
+            </a:r>
+            <a:r>
+              <a:rPr lang="zh-CN" altLang="en-US"/>
+              <a:t>&lt;a v-on:click="doSomething"&gt;</a:t>
+            </a:r>
+            <a:endParaRPr lang="zh-CN" altLang="en-US"/>
+          </a:p>
+          <a:p>
+            <a:pPr marL="0" indent="0">
+              <a:buNone/>
+            </a:pPr>
+            <a:r>
+              <a:rPr lang="en-US" altLang="zh-CN"/>
+              <a:t>	</a:t>
+            </a:r>
+            <a:r>
+              <a:rPr lang="zh-CN" altLang="en-US">
+                <a:sym typeface="+mn-ea"/>
+              </a:rPr>
+              <a:t>&lt;a </a:t>
+            </a:r>
+            <a:r>
+              <a:rPr lang="en-US" altLang="zh-CN">
+                <a:sym typeface="+mn-ea"/>
+              </a:rPr>
+              <a:t>@</a:t>
+            </a:r>
+            <a:r>
+              <a:rPr lang="zh-CN" altLang="en-US">
+                <a:sym typeface="+mn-ea"/>
+              </a:rPr>
+              <a:t>click="doSomething"&gt;     </a:t>
+            </a:r>
+            <a:r>
+              <a:rPr lang="en-US" altLang="zh-CN">
+                <a:sym typeface="+mn-ea"/>
+              </a:rPr>
+              <a:t>--</a:t>
+            </a:r>
+            <a:r>
+              <a:rPr lang="zh-CN" altLang="zh-CN">
+                <a:sym typeface="+mn-ea"/>
+              </a:rPr>
+              <a:t>缩写</a:t>
+            </a:r>
+            <a:endParaRPr lang="zh-CN" altLang="zh-CN">
+              <a:sym typeface="+mn-ea"/>
+            </a:endParaRPr>
+          </a:p>
+          <a:p>
+            <a:r>
+              <a:rPr lang="zh-CN" altLang="en-US"/>
+              <a:t>有两种形式调用方法：绑定一个方法（让事件指向方法的引用），或者使用内联语句。</a:t>
+            </a:r>
+            <a:endParaRPr lang="zh-CN" altLang="en-US"/>
+          </a:p>
+          <a:p>
+            <a:r>
+              <a:rPr lang="zh-CN" altLang="en-US"/>
+              <a:t>用在普通元素上时，只能监听 原生 DOM 事件。用在自定义元素组件上时，也可以监听子组件触发的自定义事件。</a:t>
+            </a:r>
+            <a:endParaRPr lang="zh-CN" altLang="en-US"/>
+          </a:p>
+        </p:txBody>
+      </p:sp>
+    </p:spTree>
+  </p:cSld>
+  <p:clrMapOvr>
+    <a:masterClrMapping/>
+  </p:clrMapOvr>
+</p:sld>
+</file>
+
+<file path=ppt/slides/slide21.xml><?xml version="1.0" encoding="utf-8"?>
+<p:sld xmlns:a="http://schemas.openxmlformats.org/drawingml/2006/main" xmlns:r="http://schemas.openxmlformats.org/officeDocument/2006/relationships" xmlns:p="http://schemas.openxmlformats.org/presentationml/2006/main">
+  <p:cSld>
+    <p:spTree>
+      <p:nvGrpSpPr>
+        <p:cNvPr id="1" name=""/>
+        <p:cNvGrpSpPr/>
+        <p:nvPr/>
+      </p:nvGrpSpPr>
+      <p:grpSpPr/>
+      <p:sp>
+        <p:nvSpPr>
+          <p:cNvPr id="2" name="标题 1"/>
+          <p:cNvSpPr>
+            <a:spLocks noGrp="1"/>
+          </p:cNvSpPr>
+          <p:nvPr>
+            <p:ph type="title"/>
+          </p:nvPr>
+        </p:nvSpPr>
+        <p:spPr/>
+        <p:txBody>
+          <a:bodyPr/>
+          <a:p>
+            <a:r>
+              <a:rPr lang="en-US" altLang="zh-CN"/>
               <a:t>Vue</a:t>
             </a:r>
             <a:r>
@@ -4445,6 +4538,342 @@
         <p:txBody>
           <a:bodyPr/>
           <a:p>
+            <a:r>
+              <a:rPr lang="zh-CN" altLang="en-US"/>
+              <a:t>组件（Component）是 Vue.js 最强大的功能之一。组件可以扩展 HTML 元素，封装可重用的代码。在较高层面上，组件是自定义元素， Vue.js 的编译器为它添加特殊功能。在有些情况下，组件也可以是原生 HTML 元素的形式，以 js 特性扩展。</a:t>
+            </a:r>
+            <a:endParaRPr lang="zh-CN" altLang="en-US"/>
+          </a:p>
+          <a:p>
+            <a:r>
+              <a:rPr lang="zh-CN" altLang="en-US"/>
+              <a:t>全局组件示例</a:t>
+            </a:r>
+            <a:endParaRPr lang="zh-CN" altLang="en-US"/>
+          </a:p>
+          <a:p>
+            <a:r>
+              <a:rPr lang="zh-CN" altLang="en-US"/>
+              <a:t>局部组件示例</a:t>
+            </a:r>
+            <a:endParaRPr lang="en-US" altLang="en-US"/>
+          </a:p>
+          <a:p>
+            <a:r>
+              <a:rPr lang="zh-CN" altLang="en-US"/>
+              <a:t>使用</a:t>
+            </a:r>
+            <a:r>
+              <a:rPr lang="en-US" altLang="zh-CN"/>
+              <a:t>DOM</a:t>
+            </a:r>
+            <a:r>
+              <a:rPr lang="zh-CN" altLang="en-US"/>
+              <a:t>作为模板时的限制和解决办法示例</a:t>
+            </a:r>
+            <a:endParaRPr lang="zh-CN" altLang="en-US"/>
+          </a:p>
+          <a:p>
+            <a:r>
+              <a:rPr lang="zh-CN" altLang="en-US"/>
+              <a:t>使用组件时</a:t>
+            </a:r>
+            <a:r>
+              <a:rPr lang="en-US" altLang="zh-CN"/>
+              <a:t>data</a:t>
+            </a:r>
+            <a:r>
+              <a:rPr lang="zh-CN" altLang="en-US"/>
+              <a:t>选项的限制</a:t>
+            </a:r>
+            <a:endParaRPr lang="zh-CN" altLang="en-US"/>
+          </a:p>
+        </p:txBody>
+      </p:sp>
+    </p:spTree>
+  </p:cSld>
+  <p:clrMapOvr>
+    <a:masterClrMapping/>
+  </p:clrMapOvr>
+</p:sld>
+</file>
+
+<file path=ppt/slides/slide22.xml><?xml version="1.0" encoding="utf-8"?>
+<p:sld xmlns:a="http://schemas.openxmlformats.org/drawingml/2006/main" xmlns:r="http://schemas.openxmlformats.org/officeDocument/2006/relationships" xmlns:p="http://schemas.openxmlformats.org/presentationml/2006/main">
+  <p:cSld>
+    <p:spTree>
+      <p:nvGrpSpPr>
+        <p:cNvPr id="1" name=""/>
+        <p:cNvGrpSpPr/>
+        <p:nvPr/>
+      </p:nvGrpSpPr>
+      <p:grpSpPr/>
+      <p:sp>
+        <p:nvSpPr>
+          <p:cNvPr id="2" name="标题 1"/>
+          <p:cNvSpPr>
+            <a:spLocks noGrp="1"/>
+          </p:cNvSpPr>
+          <p:nvPr>
+            <p:ph type="title"/>
+          </p:nvPr>
+        </p:nvSpPr>
+        <p:spPr/>
+        <p:txBody>
+          <a:bodyPr/>
+          <a:p>
+            <a:r>
+              <a:rPr lang="zh-CN" altLang="en-US"/>
+              <a:t>构成组件</a:t>
+            </a:r>
+            <a:r>
+              <a:rPr lang="en-US" altLang="en-US"/>
+              <a:t>:</a:t>
+            </a:r>
+            <a:endParaRPr lang="en-US" altLang="en-US"/>
+          </a:p>
+        </p:txBody>
+      </p:sp>
+      <p:sp>
+        <p:nvSpPr>
+          <p:cNvPr id="3" name="内容占位符 2"/>
+          <p:cNvSpPr>
+            <a:spLocks noGrp="1"/>
+          </p:cNvSpPr>
+          <p:nvPr>
+            <p:ph idx="1"/>
+          </p:nvPr>
+        </p:nvSpPr>
+        <p:spPr/>
+        <p:txBody>
+          <a:bodyPr/>
+          <a:p>
+            <a:r>
+              <a:rPr lang="zh-CN" altLang="en-US"/>
+              <a:t>组件意味着协同工作，通常父子组件会是这样的关系：组件 A 在它的模版中使用了组件 B </a:t>
+            </a:r>
+            <a:endParaRPr lang="zh-CN" altLang="en-US"/>
+          </a:p>
+          <a:p>
+            <a:r>
+              <a:rPr lang="zh-CN" altLang="en-US"/>
+              <a:t>父子组件之间必然需要相互通信</a:t>
+            </a:r>
+            <a:endParaRPr lang="zh-CN" altLang="en-US"/>
+          </a:p>
+          <a:p>
+            <a:r>
+              <a:rPr lang="zh-CN" altLang="en-US"/>
+              <a:t>父子组件解耦是很重要的</a:t>
+            </a:r>
+            <a:r>
+              <a:rPr lang="en-US" altLang="zh-CN"/>
+              <a:t>,</a:t>
+            </a:r>
+            <a:r>
+              <a:rPr lang="zh-CN" altLang="zh-CN"/>
+              <a:t>这</a:t>
+            </a:r>
+            <a:r>
+              <a:rPr lang="en-US" altLang="zh-CN"/>
+              <a:t>保证了每个组件可以在相对隔离的环境中书写和理解，也大幅提高了组件的可维护性和可重用性</a:t>
+            </a:r>
+            <a:endParaRPr lang="en-US" altLang="zh-CN"/>
+          </a:p>
+          <a:p>
+            <a:r>
+              <a:rPr lang="en-US" altLang="zh-CN"/>
+              <a:t>组件实例的作用域是孤立的</a:t>
+            </a:r>
+            <a:endParaRPr lang="en-US" altLang="zh-CN"/>
+          </a:p>
+          <a:p>
+            <a:r>
+              <a:rPr lang="en-US" altLang="zh-CN"/>
+              <a:t>Vue</a:t>
+            </a:r>
+            <a:r>
+              <a:rPr lang="zh-CN" altLang="zh-CN"/>
+              <a:t>是如何实现父子组件之间的通信的呢</a:t>
+            </a:r>
+            <a:r>
+              <a:rPr lang="en-US" altLang="zh-CN"/>
+              <a:t>?</a:t>
+            </a:r>
+            <a:endParaRPr lang="en-US" altLang="zh-CN"/>
+          </a:p>
+          <a:p>
+            <a:endParaRPr lang="en-US" altLang="zh-CN"/>
+          </a:p>
+        </p:txBody>
+      </p:sp>
+    </p:spTree>
+  </p:cSld>
+  <p:clrMapOvr>
+    <a:masterClrMapping/>
+  </p:clrMapOvr>
+</p:sld>
+</file>
+
+<file path=ppt/slides/slide23.xml><?xml version="1.0" encoding="utf-8"?>
+<p:sld xmlns:a="http://schemas.openxmlformats.org/drawingml/2006/main" xmlns:r="http://schemas.openxmlformats.org/officeDocument/2006/relationships" xmlns:p="http://schemas.openxmlformats.org/presentationml/2006/main">
+  <p:cSld>
+    <p:spTree>
+      <p:nvGrpSpPr>
+        <p:cNvPr id="1" name=""/>
+        <p:cNvGrpSpPr/>
+        <p:nvPr/>
+      </p:nvGrpSpPr>
+      <p:grpSpPr/>
+      <p:pic>
+        <p:nvPicPr>
+          <p:cNvPr id="4" name="图片 3" descr="props-events"/>
+          <p:cNvPicPr>
+            <a:picLocks noChangeAspect="1"/>
+          </p:cNvPicPr>
+          <p:nvPr/>
+        </p:nvPicPr>
+        <p:blipFill>
+          <a:blip r:embed="rId1"/>
+          <a:stretch>
+            <a:fillRect/>
+          </a:stretch>
+        </p:blipFill>
+        <p:spPr>
+          <a:xfrm>
+            <a:off x="3631565" y="2312035"/>
+            <a:ext cx="4762500" cy="3894455"/>
+          </a:xfrm>
+          <a:prstGeom prst="rect">
+            <a:avLst/>
+          </a:prstGeom>
+        </p:spPr>
+      </p:pic>
+      <p:sp>
+        <p:nvSpPr>
+          <p:cNvPr id="2" name="标题 1"/>
+          <p:cNvSpPr>
+            <a:spLocks noGrp="1"/>
+          </p:cNvSpPr>
+          <p:nvPr>
+            <p:ph type="title"/>
+          </p:nvPr>
+        </p:nvSpPr>
+        <p:spPr/>
+        <p:txBody>
+          <a:bodyPr/>
+          <a:p>
+            <a:r>
+              <a:rPr lang="en-US" altLang="zh-CN"/>
+              <a:t>Vue.js</a:t>
+            </a:r>
+            <a:r>
+              <a:rPr lang="zh-CN" altLang="zh-CN"/>
+              <a:t>如何实现父子组件之间的通信</a:t>
+            </a:r>
+            <a:endParaRPr lang="zh-CN" altLang="zh-CN"/>
+          </a:p>
+        </p:txBody>
+      </p:sp>
+      <p:sp>
+        <p:nvSpPr>
+          <p:cNvPr id="3" name="内容占位符 2"/>
+          <p:cNvSpPr>
+            <a:spLocks noGrp="1"/>
+          </p:cNvSpPr>
+          <p:nvPr>
+            <p:ph idx="1"/>
+          </p:nvPr>
+        </p:nvSpPr>
+        <p:spPr>
+          <a:xfrm>
+            <a:off x="838200" y="1504315"/>
+            <a:ext cx="10515600" cy="4351338"/>
+          </a:xfrm>
+        </p:spPr>
+        <p:txBody>
+          <a:bodyPr/>
+          <a:p>
+            <a:r>
+              <a:rPr lang="zh-CN" altLang="en-US"/>
+              <a:t>在 Vue.js 中，父子组件的关系可以总结为 props down, events up 。父组件通过 props 向下传递数据给子组件，子组件通过 events 给父组件发送消息。</a:t>
+            </a:r>
+            <a:endParaRPr lang="zh-CN" altLang="en-US"/>
+          </a:p>
+        </p:txBody>
+      </p:sp>
+    </p:spTree>
+  </p:cSld>
+  <p:clrMapOvr>
+    <a:masterClrMapping/>
+  </p:clrMapOvr>
+</p:sld>
+</file>
+
+<file path=ppt/slides/slide24.xml><?xml version="1.0" encoding="utf-8"?>
+<p:sld xmlns:a="http://schemas.openxmlformats.org/drawingml/2006/main" xmlns:r="http://schemas.openxmlformats.org/officeDocument/2006/relationships" xmlns:p="http://schemas.openxmlformats.org/presentationml/2006/main">
+  <p:cSld>
+    <p:spTree>
+      <p:nvGrpSpPr>
+        <p:cNvPr id="1" name=""/>
+        <p:cNvGrpSpPr/>
+        <p:nvPr/>
+      </p:nvGrpSpPr>
+      <p:grpSpPr/>
+      <p:sp>
+        <p:nvSpPr>
+          <p:cNvPr id="2" name="标题 1"/>
+          <p:cNvSpPr>
+            <a:spLocks noGrp="1"/>
+          </p:cNvSpPr>
+          <p:nvPr>
+            <p:ph type="title"/>
+          </p:nvPr>
+        </p:nvSpPr>
+        <p:spPr/>
+        <p:txBody>
+          <a:bodyPr/>
+          <a:p>
+            <a:r>
+              <a:rPr lang="en-US" altLang="zh-CN"/>
+              <a:t>Prop</a:t>
+            </a:r>
+            <a:r>
+              <a:rPr lang="zh-CN" altLang="en-US"/>
+              <a:t>传递数据：</a:t>
+            </a:r>
+            <a:endParaRPr lang="zh-CN" altLang="en-US"/>
+          </a:p>
+        </p:txBody>
+      </p:sp>
+      <p:sp>
+        <p:nvSpPr>
+          <p:cNvPr id="3" name="内容占位符 2"/>
+          <p:cNvSpPr>
+            <a:spLocks noGrp="1"/>
+          </p:cNvSpPr>
+          <p:nvPr>
+            <p:ph idx="1"/>
+          </p:nvPr>
+        </p:nvSpPr>
+        <p:spPr/>
+        <p:txBody>
+          <a:bodyPr/>
+          <a:p>
+            <a:r>
+              <a:rPr lang="zh-CN" altLang="en-US"/>
+              <a:t>要让子组件使用父组件的数据，我们需要通过子组件的props选项，</a:t>
+            </a:r>
+            <a:endParaRPr lang="zh-CN" altLang="en-US"/>
+          </a:p>
+          <a:p>
+            <a:pPr marL="0" indent="0">
+              <a:buNone/>
+            </a:pPr>
+            <a:r>
+              <a:rPr lang="zh-CN" altLang="en-US"/>
+              <a:t>子组件要显式地用 props 选项声明它期待获得的数据。</a:t>
+            </a:r>
             <a:endParaRPr lang="zh-CN" altLang="en-US"/>
           </a:p>
         </p:txBody>

</xml_diff>